<commit_message>
Design edits on 01-Introduction-to-IT-Systems.pptx
</commit_message>
<xml_diff>
--- a/Courses/Software-Sciences/Module-4-Information-Systems-New/01-Introduction-to-IT-Systems/01-Introduction-to-IT-Systems.pptx
+++ b/Courses/Software-Sciences/Module-4-Information-Systems-New/01-Introduction-to-IT-Systems/01-Introduction-to-IT-Systems.pptx
@@ -325,7 +325,7 @@
           <a:p>
             <a:fld id="{4E087215-0C8F-4762-A664-737A353EC9A4}" type="datetimeFigureOut">
               <a:rPr lang="bg-BG" smtClean="0"/>
-              <a:t>3.04.24 г.</a:t>
+              <a:t>4.04.24 г.</a:t>
             </a:fld>
             <a:endParaRPr lang="bg-BG"/>
           </a:p>
@@ -521,7 +521,7 @@
           <a:p>
             <a:fld id="{72D84649-876A-46C9-8472-14CB09C070D8}" type="datetimeFigureOut">
               <a:rPr lang="en-US" smtClean="0"/>
-              <a:t>4/3/24</a:t>
+              <a:t>4/4/24</a:t>
             </a:fld>
             <a:endParaRPr lang="en-US"/>
           </a:p>
@@ -1121,7 +1121,7 @@
             <a:fld id="{3EBA5BD7-F043-4D1B-AA17-CD412FC534DE}" type="slidenum">
               <a:rPr lang="en-US" smtClean="0"/>
               <a:pPr/>
-              <a:t>12</a:t>
+              <a:t>11</a:t>
             </a:fld>
             <a:endParaRPr lang="en-US" dirty="0"/>
           </a:p>
@@ -1169,7 +1169,7 @@
     </p:spTree>
     <p:extLst>
       <p:ext uri="{BB962C8B-B14F-4D97-AF65-F5344CB8AC3E}">
-        <p14:creationId xmlns:p14="http://schemas.microsoft.com/office/powerpoint/2010/main" val="1966727200"/>
+        <p14:creationId xmlns:p14="http://schemas.microsoft.com/office/powerpoint/2010/main" val="986854748"/>
       </p:ext>
     </p:extLst>
   </p:cSld>
@@ -1351,7 +1351,7 @@
             <a:fld id="{3EBA5BD7-F043-4D1B-AA17-CD412FC534DE}" type="slidenum">
               <a:rPr lang="en-US" smtClean="0"/>
               <a:pPr/>
-              <a:t>13</a:t>
+              <a:t>12</a:t>
             </a:fld>
             <a:endParaRPr lang="en-US" dirty="0"/>
           </a:p>
@@ -1399,7 +1399,7 @@
     </p:spTree>
     <p:extLst>
       <p:ext uri="{BB962C8B-B14F-4D97-AF65-F5344CB8AC3E}">
-        <p14:creationId xmlns:p14="http://schemas.microsoft.com/office/powerpoint/2010/main" val="2452153898"/>
+        <p14:creationId xmlns:p14="http://schemas.microsoft.com/office/powerpoint/2010/main" val="1966727200"/>
       </p:ext>
     </p:extLst>
   </p:cSld>
@@ -1453,16 +1453,16 @@
           <a:bodyPr/>
           <a:lstStyle/>
           <a:p>
-            <a:endParaRPr lang="en-US"/>
+            <a:endParaRPr lang="en-US" dirty="0"/>
           </a:p>
         </p:txBody>
       </p:sp>
       <p:sp>
         <p:nvSpPr>
-          <p:cNvPr id="7" name="Slide Number Placeholder 5">
+          <p:cNvPr id="6" name="Slide Number Placeholder 5">
             <a:extLst>
               <a:ext uri="{FF2B5EF4-FFF2-40B4-BE49-F238E27FC236}">
-                <a16:creationId xmlns:a16="http://schemas.microsoft.com/office/drawing/2014/main" id="{BD88B0D8-949C-482D-990A-2DAB14AD4AD1}"/>
+                <a16:creationId xmlns:a16="http://schemas.microsoft.com/office/drawing/2014/main" id="{973EF363-177A-44DE-80E9-FC9248B7DCA2}"/>
               </a:ext>
             </a:extLst>
           </p:cNvPr>
@@ -1581,7 +1581,7 @@
             <a:fld id="{3EBA5BD7-F043-4D1B-AA17-CD412FC534DE}" type="slidenum">
               <a:rPr lang="en-US" smtClean="0"/>
               <a:pPr/>
-              <a:t>14</a:t>
+              <a:t>13</a:t>
             </a:fld>
             <a:endParaRPr lang="en-US" dirty="0"/>
           </a:p>
@@ -1592,7 +1592,7 @@
           <p:cNvPr id="4" name="Footer Placeholder 3">
             <a:extLst>
               <a:ext uri="{FF2B5EF4-FFF2-40B4-BE49-F238E27FC236}">
-                <a16:creationId xmlns:a16="http://schemas.microsoft.com/office/drawing/2014/main" id="{58474633-D38D-4432-867B-70F325FA7016}"/>
+                <a16:creationId xmlns:a16="http://schemas.microsoft.com/office/drawing/2014/main" id="{8EE613EE-6697-4964-A067-C2136C00C834}"/>
               </a:ext>
             </a:extLst>
           </p:cNvPr>
@@ -1629,7 +1629,7 @@
     </p:spTree>
     <p:extLst>
       <p:ext uri="{BB962C8B-B14F-4D97-AF65-F5344CB8AC3E}">
-        <p14:creationId xmlns:p14="http://schemas.microsoft.com/office/powerpoint/2010/main" val="1802721241"/>
+        <p14:creationId xmlns:p14="http://schemas.microsoft.com/office/powerpoint/2010/main" val="2452153898"/>
       </p:ext>
     </p:extLst>
   </p:cSld>
@@ -1689,10 +1689,10 @@
       </p:sp>
       <p:sp>
         <p:nvSpPr>
-          <p:cNvPr id="6" name="Slide Number Placeholder 5">
+          <p:cNvPr id="7" name="Slide Number Placeholder 5">
             <a:extLst>
               <a:ext uri="{FF2B5EF4-FFF2-40B4-BE49-F238E27FC236}">
-                <a16:creationId xmlns:a16="http://schemas.microsoft.com/office/drawing/2014/main" id="{973EF363-177A-44DE-80E9-FC9248B7DCA2}"/>
+                <a16:creationId xmlns:a16="http://schemas.microsoft.com/office/drawing/2014/main" id="{BD88B0D8-949C-482D-990A-2DAB14AD4AD1}"/>
               </a:ext>
             </a:extLst>
           </p:cNvPr>
@@ -1811,7 +1811,7 @@
             <a:fld id="{3EBA5BD7-F043-4D1B-AA17-CD412FC534DE}" type="slidenum">
               <a:rPr lang="en-US" smtClean="0"/>
               <a:pPr/>
-              <a:t>15</a:t>
+              <a:t>14</a:t>
             </a:fld>
             <a:endParaRPr lang="en-US" dirty="0"/>
           </a:p>
@@ -1822,7 +1822,7 @@
           <p:cNvPr id="4" name="Footer Placeholder 3">
             <a:extLst>
               <a:ext uri="{FF2B5EF4-FFF2-40B4-BE49-F238E27FC236}">
-                <a16:creationId xmlns:a16="http://schemas.microsoft.com/office/drawing/2014/main" id="{8EE613EE-6697-4964-A067-C2136C00C834}"/>
+                <a16:creationId xmlns:a16="http://schemas.microsoft.com/office/drawing/2014/main" id="{58474633-D38D-4432-867B-70F325FA7016}"/>
               </a:ext>
             </a:extLst>
           </p:cNvPr>
@@ -1859,7 +1859,7 @@
     </p:spTree>
     <p:extLst>
       <p:ext uri="{BB962C8B-B14F-4D97-AF65-F5344CB8AC3E}">
-        <p14:creationId xmlns:p14="http://schemas.microsoft.com/office/powerpoint/2010/main" val="2337055757"/>
+        <p14:creationId xmlns:p14="http://schemas.microsoft.com/office/powerpoint/2010/main" val="1802721241"/>
       </p:ext>
     </p:extLst>
   </p:cSld>
@@ -2041,7 +2041,7 @@
             <a:fld id="{3EBA5BD7-F043-4D1B-AA17-CD412FC534DE}" type="slidenum">
               <a:rPr lang="en-US" smtClean="0"/>
               <a:pPr/>
-              <a:t>16</a:t>
+              <a:t>15</a:t>
             </a:fld>
             <a:endParaRPr lang="en-US" dirty="0"/>
           </a:p>
@@ -2089,7 +2089,7 @@
     </p:spTree>
     <p:extLst>
       <p:ext uri="{BB962C8B-B14F-4D97-AF65-F5344CB8AC3E}">
-        <p14:creationId xmlns:p14="http://schemas.microsoft.com/office/powerpoint/2010/main" val="795407867"/>
+        <p14:creationId xmlns:p14="http://schemas.microsoft.com/office/powerpoint/2010/main" val="2337055757"/>
       </p:ext>
     </p:extLst>
   </p:cSld>
@@ -2271,7 +2271,7 @@
             <a:fld id="{3EBA5BD7-F043-4D1B-AA17-CD412FC534DE}" type="slidenum">
               <a:rPr lang="en-US" smtClean="0"/>
               <a:pPr/>
-              <a:t>17</a:t>
+              <a:t>16</a:t>
             </a:fld>
             <a:endParaRPr lang="en-US" dirty="0"/>
           </a:p>
@@ -2319,7 +2319,7 @@
     </p:spTree>
     <p:extLst>
       <p:ext uri="{BB962C8B-B14F-4D97-AF65-F5344CB8AC3E}">
-        <p14:creationId xmlns:p14="http://schemas.microsoft.com/office/powerpoint/2010/main" val="742667306"/>
+        <p14:creationId xmlns:p14="http://schemas.microsoft.com/office/powerpoint/2010/main" val="795407867"/>
       </p:ext>
     </p:extLst>
   </p:cSld>
@@ -2379,10 +2379,10 @@
       </p:sp>
       <p:sp>
         <p:nvSpPr>
-          <p:cNvPr id="7" name="Slide Number Placeholder 5">
+          <p:cNvPr id="6" name="Slide Number Placeholder 5">
             <a:extLst>
               <a:ext uri="{FF2B5EF4-FFF2-40B4-BE49-F238E27FC236}">
-                <a16:creationId xmlns:a16="http://schemas.microsoft.com/office/drawing/2014/main" id="{BD88B0D8-949C-482D-990A-2DAB14AD4AD1}"/>
+                <a16:creationId xmlns:a16="http://schemas.microsoft.com/office/drawing/2014/main" id="{973EF363-177A-44DE-80E9-FC9248B7DCA2}"/>
               </a:ext>
             </a:extLst>
           </p:cNvPr>
@@ -2501,7 +2501,7 @@
             <a:fld id="{3EBA5BD7-F043-4D1B-AA17-CD412FC534DE}" type="slidenum">
               <a:rPr lang="en-US" smtClean="0"/>
               <a:pPr/>
-              <a:t>18</a:t>
+              <a:t>17</a:t>
             </a:fld>
             <a:endParaRPr lang="en-US" dirty="0"/>
           </a:p>
@@ -2512,7 +2512,7 @@
           <p:cNvPr id="4" name="Footer Placeholder 3">
             <a:extLst>
               <a:ext uri="{FF2B5EF4-FFF2-40B4-BE49-F238E27FC236}">
-                <a16:creationId xmlns:a16="http://schemas.microsoft.com/office/drawing/2014/main" id="{58474633-D38D-4432-867B-70F325FA7016}"/>
+                <a16:creationId xmlns:a16="http://schemas.microsoft.com/office/drawing/2014/main" id="{8EE613EE-6697-4964-A067-C2136C00C834}"/>
               </a:ext>
             </a:extLst>
           </p:cNvPr>
@@ -2549,7 +2549,7 @@
     </p:spTree>
     <p:extLst>
       <p:ext uri="{BB962C8B-B14F-4D97-AF65-F5344CB8AC3E}">
-        <p14:creationId xmlns:p14="http://schemas.microsoft.com/office/powerpoint/2010/main" val="2023187812"/>
+        <p14:creationId xmlns:p14="http://schemas.microsoft.com/office/powerpoint/2010/main" val="742667306"/>
       </p:ext>
     </p:extLst>
   </p:cSld>
@@ -2609,10 +2609,10 @@
       </p:sp>
       <p:sp>
         <p:nvSpPr>
-          <p:cNvPr id="6" name="Slide Number Placeholder 5">
+          <p:cNvPr id="7" name="Slide Number Placeholder 5">
             <a:extLst>
               <a:ext uri="{FF2B5EF4-FFF2-40B4-BE49-F238E27FC236}">
-                <a16:creationId xmlns:a16="http://schemas.microsoft.com/office/drawing/2014/main" id="{973EF363-177A-44DE-80E9-FC9248B7DCA2}"/>
+                <a16:creationId xmlns:a16="http://schemas.microsoft.com/office/drawing/2014/main" id="{BD88B0D8-949C-482D-990A-2DAB14AD4AD1}"/>
               </a:ext>
             </a:extLst>
           </p:cNvPr>
@@ -2731,7 +2731,7 @@
             <a:fld id="{3EBA5BD7-F043-4D1B-AA17-CD412FC534DE}" type="slidenum">
               <a:rPr lang="en-US" smtClean="0"/>
               <a:pPr/>
-              <a:t>19</a:t>
+              <a:t>18</a:t>
             </a:fld>
             <a:endParaRPr lang="en-US" dirty="0"/>
           </a:p>
@@ -2742,7 +2742,7 @@
           <p:cNvPr id="4" name="Footer Placeholder 3">
             <a:extLst>
               <a:ext uri="{FF2B5EF4-FFF2-40B4-BE49-F238E27FC236}">
-                <a16:creationId xmlns:a16="http://schemas.microsoft.com/office/drawing/2014/main" id="{8EE613EE-6697-4964-A067-C2136C00C834}"/>
+                <a16:creationId xmlns:a16="http://schemas.microsoft.com/office/drawing/2014/main" id="{58474633-D38D-4432-867B-70F325FA7016}"/>
               </a:ext>
             </a:extLst>
           </p:cNvPr>
@@ -2779,7 +2779,7 @@
     </p:spTree>
     <p:extLst>
       <p:ext uri="{BB962C8B-B14F-4D97-AF65-F5344CB8AC3E}">
-        <p14:creationId xmlns:p14="http://schemas.microsoft.com/office/powerpoint/2010/main" val="1027792524"/>
+        <p14:creationId xmlns:p14="http://schemas.microsoft.com/office/powerpoint/2010/main" val="2023187812"/>
       </p:ext>
     </p:extLst>
   </p:cSld>
@@ -2961,7 +2961,7 @@
             <a:fld id="{3EBA5BD7-F043-4D1B-AA17-CD412FC534DE}" type="slidenum">
               <a:rPr lang="en-US" smtClean="0"/>
               <a:pPr/>
-              <a:t>20</a:t>
+              <a:t>19</a:t>
             </a:fld>
             <a:endParaRPr lang="en-US" dirty="0"/>
           </a:p>
@@ -3009,7 +3009,7 @@
     </p:spTree>
     <p:extLst>
       <p:ext uri="{BB962C8B-B14F-4D97-AF65-F5344CB8AC3E}">
-        <p14:creationId xmlns:p14="http://schemas.microsoft.com/office/powerpoint/2010/main" val="4077091013"/>
+        <p14:creationId xmlns:p14="http://schemas.microsoft.com/office/powerpoint/2010/main" val="1027792524"/>
       </p:ext>
     </p:extLst>
   </p:cSld>
@@ -3191,7 +3191,7 @@
             <a:fld id="{3EBA5BD7-F043-4D1B-AA17-CD412FC534DE}" type="slidenum">
               <a:rPr lang="en-US" smtClean="0"/>
               <a:pPr/>
-              <a:t>21</a:t>
+              <a:t>20</a:t>
             </a:fld>
             <a:endParaRPr lang="en-US" dirty="0"/>
           </a:p>
@@ -3239,7 +3239,7 @@
     </p:spTree>
     <p:extLst>
       <p:ext uri="{BB962C8B-B14F-4D97-AF65-F5344CB8AC3E}">
-        <p14:creationId xmlns:p14="http://schemas.microsoft.com/office/powerpoint/2010/main" val="2468650981"/>
+        <p14:creationId xmlns:p14="http://schemas.microsoft.com/office/powerpoint/2010/main" val="4077091013"/>
       </p:ext>
     </p:extLst>
   </p:cSld>
@@ -3663,7 +3663,7 @@
             <a:fld id="{3EBA5BD7-F043-4D1B-AA17-CD412FC534DE}" type="slidenum">
               <a:rPr lang="en-US" smtClean="0"/>
               <a:pPr/>
-              <a:t>22</a:t>
+              <a:t>21</a:t>
             </a:fld>
             <a:endParaRPr lang="en-US" dirty="0"/>
           </a:p>
@@ -3711,7 +3711,7 @@
     </p:spTree>
     <p:extLst>
       <p:ext uri="{BB962C8B-B14F-4D97-AF65-F5344CB8AC3E}">
-        <p14:creationId xmlns:p14="http://schemas.microsoft.com/office/powerpoint/2010/main" val="439804960"/>
+        <p14:creationId xmlns:p14="http://schemas.microsoft.com/office/powerpoint/2010/main" val="2468650981"/>
       </p:ext>
     </p:extLst>
   </p:cSld>
@@ -3893,7 +3893,7 @@
             <a:fld id="{3EBA5BD7-F043-4D1B-AA17-CD412FC534DE}" type="slidenum">
               <a:rPr lang="en-US" smtClean="0"/>
               <a:pPr/>
-              <a:t>23</a:t>
+              <a:t>22</a:t>
             </a:fld>
             <a:endParaRPr lang="en-US" dirty="0"/>
           </a:p>
@@ -3941,7 +3941,7 @@
     </p:spTree>
     <p:extLst>
       <p:ext uri="{BB962C8B-B14F-4D97-AF65-F5344CB8AC3E}">
-        <p14:creationId xmlns:p14="http://schemas.microsoft.com/office/powerpoint/2010/main" val="1000881190"/>
+        <p14:creationId xmlns:p14="http://schemas.microsoft.com/office/powerpoint/2010/main" val="439804960"/>
       </p:ext>
     </p:extLst>
   </p:cSld>
@@ -3995,7 +3995,7 @@
           <a:bodyPr/>
           <a:lstStyle/>
           <a:p>
-            <a:endParaRPr lang="en-US"/>
+            <a:endParaRPr lang="en-US" dirty="0"/>
           </a:p>
         </p:txBody>
       </p:sp>
@@ -4123,7 +4123,7 @@
             <a:fld id="{3EBA5BD7-F043-4D1B-AA17-CD412FC534DE}" type="slidenum">
               <a:rPr lang="en-US" smtClean="0"/>
               <a:pPr/>
-              <a:t>24</a:t>
+              <a:t>23</a:t>
             </a:fld>
             <a:endParaRPr lang="en-US" dirty="0"/>
           </a:p>
@@ -4171,7 +4171,7 @@
     </p:spTree>
     <p:extLst>
       <p:ext uri="{BB962C8B-B14F-4D97-AF65-F5344CB8AC3E}">
-        <p14:creationId xmlns:p14="http://schemas.microsoft.com/office/powerpoint/2010/main" val="1698850810"/>
+        <p14:creationId xmlns:p14="http://schemas.microsoft.com/office/powerpoint/2010/main" val="1000881190"/>
       </p:ext>
     </p:extLst>
   </p:cSld>
@@ -4353,7 +4353,7 @@
             <a:fld id="{3EBA5BD7-F043-4D1B-AA17-CD412FC534DE}" type="slidenum">
               <a:rPr lang="en-US" smtClean="0"/>
               <a:pPr/>
-              <a:t>25</a:t>
+              <a:t>24</a:t>
             </a:fld>
             <a:endParaRPr lang="en-US" dirty="0"/>
           </a:p>
@@ -4401,7 +4401,7 @@
     </p:spTree>
     <p:extLst>
       <p:ext uri="{BB962C8B-B14F-4D97-AF65-F5344CB8AC3E}">
-        <p14:creationId xmlns:p14="http://schemas.microsoft.com/office/powerpoint/2010/main" val="1788490882"/>
+        <p14:creationId xmlns:p14="http://schemas.microsoft.com/office/powerpoint/2010/main" val="1698850810"/>
       </p:ext>
     </p:extLst>
   </p:cSld>
@@ -4583,7 +4583,7 @@
             <a:fld id="{3EBA5BD7-F043-4D1B-AA17-CD412FC534DE}" type="slidenum">
               <a:rPr lang="en-US" smtClean="0"/>
               <a:pPr/>
-              <a:t>26</a:t>
+              <a:t>25</a:t>
             </a:fld>
             <a:endParaRPr lang="en-US" dirty="0"/>
           </a:p>
@@ -4631,7 +4631,7 @@
     </p:spTree>
     <p:extLst>
       <p:ext uri="{BB962C8B-B14F-4D97-AF65-F5344CB8AC3E}">
-        <p14:creationId xmlns:p14="http://schemas.microsoft.com/office/powerpoint/2010/main" val="2903596723"/>
+        <p14:creationId xmlns:p14="http://schemas.microsoft.com/office/powerpoint/2010/main" val="1788490882"/>
       </p:ext>
     </p:extLst>
   </p:cSld>
@@ -4813,7 +4813,7 @@
             <a:fld id="{3EBA5BD7-F043-4D1B-AA17-CD412FC534DE}" type="slidenum">
               <a:rPr lang="en-US" smtClean="0"/>
               <a:pPr/>
-              <a:t>27</a:t>
+              <a:t>26</a:t>
             </a:fld>
             <a:endParaRPr lang="en-US" dirty="0"/>
           </a:p>
@@ -4861,7 +4861,7 @@
     </p:spTree>
     <p:extLst>
       <p:ext uri="{BB962C8B-B14F-4D97-AF65-F5344CB8AC3E}">
-        <p14:creationId xmlns:p14="http://schemas.microsoft.com/office/powerpoint/2010/main" val="2566611129"/>
+        <p14:creationId xmlns:p14="http://schemas.microsoft.com/office/powerpoint/2010/main" val="2903596723"/>
       </p:ext>
     </p:extLst>
   </p:cSld>
@@ -5043,7 +5043,7 @@
             <a:fld id="{3EBA5BD7-F043-4D1B-AA17-CD412FC534DE}" type="slidenum">
               <a:rPr lang="en-US" smtClean="0"/>
               <a:pPr/>
-              <a:t>28</a:t>
+              <a:t>27</a:t>
             </a:fld>
             <a:endParaRPr lang="en-US" dirty="0"/>
           </a:p>
@@ -5091,7 +5091,7 @@
     </p:spTree>
     <p:extLst>
       <p:ext uri="{BB962C8B-B14F-4D97-AF65-F5344CB8AC3E}">
-        <p14:creationId xmlns:p14="http://schemas.microsoft.com/office/powerpoint/2010/main" val="1244499502"/>
+        <p14:creationId xmlns:p14="http://schemas.microsoft.com/office/powerpoint/2010/main" val="2566611129"/>
       </p:ext>
     </p:extLst>
   </p:cSld>
@@ -5273,7 +5273,7 @@
             <a:fld id="{3EBA5BD7-F043-4D1B-AA17-CD412FC534DE}" type="slidenum">
               <a:rPr lang="en-US" smtClean="0"/>
               <a:pPr/>
-              <a:t>29</a:t>
+              <a:t>28</a:t>
             </a:fld>
             <a:endParaRPr lang="en-US" dirty="0"/>
           </a:p>
@@ -5321,7 +5321,7 @@
     </p:spTree>
     <p:extLst>
       <p:ext uri="{BB962C8B-B14F-4D97-AF65-F5344CB8AC3E}">
-        <p14:creationId xmlns:p14="http://schemas.microsoft.com/office/powerpoint/2010/main" val="1959710392"/>
+        <p14:creationId xmlns:p14="http://schemas.microsoft.com/office/powerpoint/2010/main" val="1244499502"/>
       </p:ext>
     </p:extLst>
   </p:cSld>
@@ -5503,7 +5503,7 @@
             <a:fld id="{3EBA5BD7-F043-4D1B-AA17-CD412FC534DE}" type="slidenum">
               <a:rPr lang="en-US" smtClean="0"/>
               <a:pPr/>
-              <a:t>30</a:t>
+              <a:t>29</a:t>
             </a:fld>
             <a:endParaRPr lang="en-US" dirty="0"/>
           </a:p>
@@ -5551,7 +5551,7 @@
     </p:spTree>
     <p:extLst>
       <p:ext uri="{BB962C8B-B14F-4D97-AF65-F5344CB8AC3E}">
-        <p14:creationId xmlns:p14="http://schemas.microsoft.com/office/powerpoint/2010/main" val="751907221"/>
+        <p14:creationId xmlns:p14="http://schemas.microsoft.com/office/powerpoint/2010/main" val="1959710392"/>
       </p:ext>
     </p:extLst>
   </p:cSld>
@@ -5733,7 +5733,7 @@
             <a:fld id="{3EBA5BD7-F043-4D1B-AA17-CD412FC534DE}" type="slidenum">
               <a:rPr lang="en-US" smtClean="0"/>
               <a:pPr/>
-              <a:t>31</a:t>
+              <a:t>30</a:t>
             </a:fld>
             <a:endParaRPr lang="en-US" dirty="0"/>
           </a:p>
@@ -5781,7 +5781,7 @@
     </p:spTree>
     <p:extLst>
       <p:ext uri="{BB962C8B-B14F-4D97-AF65-F5344CB8AC3E}">
-        <p14:creationId xmlns:p14="http://schemas.microsoft.com/office/powerpoint/2010/main" val="2007254212"/>
+        <p14:creationId xmlns:p14="http://schemas.microsoft.com/office/powerpoint/2010/main" val="751907221"/>
       </p:ext>
     </p:extLst>
   </p:cSld>
@@ -6193,7 +6193,7 @@
             <a:fld id="{3EBA5BD7-F043-4D1B-AA17-CD412FC534DE}" type="slidenum">
               <a:rPr lang="en-US" smtClean="0"/>
               <a:pPr/>
-              <a:t>32</a:t>
+              <a:t>31</a:t>
             </a:fld>
             <a:endParaRPr lang="en-US" dirty="0"/>
           </a:p>
@@ -6241,7 +6241,7 @@
     </p:spTree>
     <p:extLst>
       <p:ext uri="{BB962C8B-B14F-4D97-AF65-F5344CB8AC3E}">
-        <p14:creationId xmlns:p14="http://schemas.microsoft.com/office/powerpoint/2010/main" val="4188773771"/>
+        <p14:creationId xmlns:p14="http://schemas.microsoft.com/office/powerpoint/2010/main" val="2007254212"/>
       </p:ext>
     </p:extLst>
   </p:cSld>
@@ -6423,7 +6423,7 @@
             <a:fld id="{3EBA5BD7-F043-4D1B-AA17-CD412FC534DE}" type="slidenum">
               <a:rPr lang="en-US" smtClean="0"/>
               <a:pPr/>
-              <a:t>33</a:t>
+              <a:t>32</a:t>
             </a:fld>
             <a:endParaRPr lang="en-US" dirty="0"/>
           </a:p>
@@ -6471,7 +6471,7 @@
     </p:spTree>
     <p:extLst>
       <p:ext uri="{BB962C8B-B14F-4D97-AF65-F5344CB8AC3E}">
-        <p14:creationId xmlns:p14="http://schemas.microsoft.com/office/powerpoint/2010/main" val="3774608689"/>
+        <p14:creationId xmlns:p14="http://schemas.microsoft.com/office/powerpoint/2010/main" val="4188773771"/>
       </p:ext>
     </p:extLst>
   </p:cSld>
@@ -6525,16 +6525,16 @@
           <a:bodyPr/>
           <a:lstStyle/>
           <a:p>
-            <a:endParaRPr lang="en-US" dirty="0"/>
+            <a:endParaRPr lang="en-US"/>
           </a:p>
         </p:txBody>
       </p:sp>
       <p:sp>
         <p:nvSpPr>
-          <p:cNvPr id="7" name="Slide Number Placeholder 5">
+          <p:cNvPr id="6" name="Slide Number Placeholder 5">
             <a:extLst>
               <a:ext uri="{FF2B5EF4-FFF2-40B4-BE49-F238E27FC236}">
-                <a16:creationId xmlns:a16="http://schemas.microsoft.com/office/drawing/2014/main" id="{E65F1CA9-65DC-416B-8882-B3A5E415CE67}"/>
+                <a16:creationId xmlns:a16="http://schemas.microsoft.com/office/drawing/2014/main" id="{973EF363-177A-44DE-80E9-FC9248B7DCA2}"/>
               </a:ext>
             </a:extLst>
           </p:cNvPr>
@@ -6653,7 +6653,7 @@
             <a:fld id="{3EBA5BD7-F043-4D1B-AA17-CD412FC534DE}" type="slidenum">
               <a:rPr lang="en-US" smtClean="0"/>
               <a:pPr/>
-              <a:t>34</a:t>
+              <a:t>33</a:t>
             </a:fld>
             <a:endParaRPr lang="en-US" dirty="0"/>
           </a:p>
@@ -6661,10 +6661,10 @@
       </p:sp>
       <p:sp>
         <p:nvSpPr>
-          <p:cNvPr id="5" name="Footer Placeholder 7">
+          <p:cNvPr id="4" name="Footer Placeholder 3">
             <a:extLst>
               <a:ext uri="{FF2B5EF4-FFF2-40B4-BE49-F238E27FC236}">
-                <a16:creationId xmlns:a16="http://schemas.microsoft.com/office/drawing/2014/main" id="{43FAF785-0C8D-730E-8E59-68198DC82CE0}"/>
+                <a16:creationId xmlns:a16="http://schemas.microsoft.com/office/drawing/2014/main" id="{8EE613EE-6697-4964-A067-C2136C00C834}"/>
               </a:ext>
             </a:extLst>
           </p:cNvPr>
@@ -6675,49 +6675,33 @@
             <p:ph type="ftr" sz="quarter" idx="4"/>
           </p:nvPr>
         </p:nvSpPr>
-        <p:spPr>
-          <a:xfrm>
-            <a:off x="-1" y="8892000"/>
-            <a:ext cx="6488999" cy="252000"/>
-          </a:xfrm>
-          <a:prstGeom prst="rect">
-            <a:avLst/>
-          </a:prstGeom>
-        </p:spPr>
+        <p:spPr/>
         <p:txBody>
-          <a:bodyPr vert="horz" lIns="91440" tIns="45720" rIns="91440" bIns="45720" rtlCol="0" anchor="b"/>
-          <a:lstStyle>
-            <a:lvl1pPr algn="l">
-              <a:defRPr sz="1100"/>
-            </a:lvl1pPr>
-          </a:lstStyle>
-          <a:p>
-            <a:r>
-              <a:rPr lang="bg-BG" sz="1100" dirty="0"/>
-              <a:t>Работна група </a:t>
-            </a:r>
-            <a:r>
-              <a:rPr lang="bg-BG" dirty="0"/>
-              <a:t>"Образование по програмиране и ИТ"</a:t>
-            </a:r>
-            <a:r>
-              <a:rPr lang="bg-BG" sz="1100" dirty="0"/>
-              <a:t>, с подкрепата на </a:t>
-            </a:r>
-            <a:r>
-              <a:rPr lang="en-US" sz="1100" dirty="0">
+          <a:bodyPr/>
+          <a:lstStyle/>
+          <a:p>
+            <a:r>
+              <a:rPr lang="en-US"/>
+              <a:t>© SoftUni – </a:t>
+            </a:r>
+            <a:r>
+              <a:rPr lang="en-US" u="sng">
                 <a:hlinkClick r:id="rId3"/>
               </a:rPr>
-              <a:t>SoftUni</a:t>
-            </a:r>
-            <a:endParaRPr lang="en-US" sz="1100" dirty="0"/>
+              <a:t>https://softuni.org</a:t>
+            </a:r>
+            <a:r>
+              <a:rPr lang="en-US"/>
+              <a:t>. Copyrighted document. Unauthorized copy or reproduction is not permitted.</a:t>
+            </a:r>
+            <a:endParaRPr lang="en-US" dirty="0"/>
           </a:p>
         </p:txBody>
       </p:sp>
     </p:spTree>
     <p:extLst>
       <p:ext uri="{BB962C8B-B14F-4D97-AF65-F5344CB8AC3E}">
-        <p14:creationId xmlns:p14="http://schemas.microsoft.com/office/powerpoint/2010/main" val="2689344733"/>
+        <p14:creationId xmlns:p14="http://schemas.microsoft.com/office/powerpoint/2010/main" val="3774608689"/>
       </p:ext>
     </p:extLst>
   </p:cSld>
@@ -6780,7 +6764,7 @@
           <p:cNvPr id="7" name="Slide Number Placeholder 5">
             <a:extLst>
               <a:ext uri="{FF2B5EF4-FFF2-40B4-BE49-F238E27FC236}">
-                <a16:creationId xmlns:a16="http://schemas.microsoft.com/office/drawing/2014/main" id="{5049B984-F964-47FF-8179-0A3007CE21CD}"/>
+                <a16:creationId xmlns:a16="http://schemas.microsoft.com/office/drawing/2014/main" id="{E65F1CA9-65DC-416B-8882-B3A5E415CE67}"/>
               </a:ext>
             </a:extLst>
           </p:cNvPr>
@@ -6899,6 +6883,252 @@
             <a:fld id="{3EBA5BD7-F043-4D1B-AA17-CD412FC534DE}" type="slidenum">
               <a:rPr lang="en-US" smtClean="0"/>
               <a:pPr/>
+              <a:t>34</a:t>
+            </a:fld>
+            <a:endParaRPr lang="en-US" dirty="0"/>
+          </a:p>
+        </p:txBody>
+      </p:sp>
+      <p:sp>
+        <p:nvSpPr>
+          <p:cNvPr id="5" name="Footer Placeholder 7">
+            <a:extLst>
+              <a:ext uri="{FF2B5EF4-FFF2-40B4-BE49-F238E27FC236}">
+                <a16:creationId xmlns:a16="http://schemas.microsoft.com/office/drawing/2014/main" id="{43FAF785-0C8D-730E-8E59-68198DC82CE0}"/>
+              </a:ext>
+            </a:extLst>
+          </p:cNvPr>
+          <p:cNvSpPr>
+            <a:spLocks noGrp="1"/>
+          </p:cNvSpPr>
+          <p:nvPr>
+            <p:ph type="ftr" sz="quarter" idx="4"/>
+          </p:nvPr>
+        </p:nvSpPr>
+        <p:spPr>
+          <a:xfrm>
+            <a:off x="-1" y="8892000"/>
+            <a:ext cx="6488999" cy="252000"/>
+          </a:xfrm>
+          <a:prstGeom prst="rect">
+            <a:avLst/>
+          </a:prstGeom>
+        </p:spPr>
+        <p:txBody>
+          <a:bodyPr vert="horz" lIns="91440" tIns="45720" rIns="91440" bIns="45720" rtlCol="0" anchor="b"/>
+          <a:lstStyle>
+            <a:lvl1pPr algn="l">
+              <a:defRPr sz="1100"/>
+            </a:lvl1pPr>
+          </a:lstStyle>
+          <a:p>
+            <a:r>
+              <a:rPr lang="bg-BG" sz="1100" dirty="0"/>
+              <a:t>Работна група </a:t>
+            </a:r>
+            <a:r>
+              <a:rPr lang="bg-BG" dirty="0"/>
+              <a:t>"Образование по програмиране и ИТ"</a:t>
+            </a:r>
+            <a:r>
+              <a:rPr lang="bg-BG" sz="1100" dirty="0"/>
+              <a:t>, с подкрепата на </a:t>
+            </a:r>
+            <a:r>
+              <a:rPr lang="en-US" sz="1100" dirty="0">
+                <a:hlinkClick r:id="rId3"/>
+              </a:rPr>
+              <a:t>SoftUni</a:t>
+            </a:r>
+            <a:endParaRPr lang="en-US" sz="1100" dirty="0"/>
+          </a:p>
+        </p:txBody>
+      </p:sp>
+    </p:spTree>
+    <p:extLst>
+      <p:ext uri="{BB962C8B-B14F-4D97-AF65-F5344CB8AC3E}">
+        <p14:creationId xmlns:p14="http://schemas.microsoft.com/office/powerpoint/2010/main" val="2689344733"/>
+      </p:ext>
+    </p:extLst>
+  </p:cSld>
+  <p:clrMapOvr>
+    <a:masterClrMapping/>
+  </p:clrMapOvr>
+</p:notes>
+</file>
+
+<file path=ppt/notesSlides/notesSlide34.xml><?xml version="1.0" encoding="utf-8"?>
+<p:notes xmlns:a="http://schemas.openxmlformats.org/drawingml/2006/main" xmlns:r="http://schemas.openxmlformats.org/officeDocument/2006/relationships" xmlns:p="http://schemas.openxmlformats.org/presentationml/2006/main">
+  <p:cSld>
+    <p:spTree>
+      <p:nvGrpSpPr>
+        <p:cNvPr id="1" name=""/>
+        <p:cNvGrpSpPr/>
+        <p:nvPr/>
+      </p:nvGrpSpPr>
+      <p:grpSpPr>
+        <a:xfrm>
+          <a:off x="0" y="0"/>
+          <a:ext cx="0" cy="0"/>
+          <a:chOff x="0" y="0"/>
+          <a:chExt cx="0" cy="0"/>
+        </a:xfrm>
+      </p:grpSpPr>
+      <p:sp>
+        <p:nvSpPr>
+          <p:cNvPr id="2" name="Slide Image Placeholder 1"/>
+          <p:cNvSpPr>
+            <a:spLocks noGrp="1" noRot="1" noChangeAspect="1"/>
+          </p:cNvSpPr>
+          <p:nvPr>
+            <p:ph type="sldImg"/>
+          </p:nvPr>
+        </p:nvSpPr>
+        <p:spPr/>
+      </p:sp>
+      <p:sp>
+        <p:nvSpPr>
+          <p:cNvPr id="3" name="Notes Placeholder 2"/>
+          <p:cNvSpPr>
+            <a:spLocks noGrp="1"/>
+          </p:cNvSpPr>
+          <p:nvPr>
+            <p:ph type="body" idx="1"/>
+          </p:nvPr>
+        </p:nvSpPr>
+        <p:spPr/>
+        <p:txBody>
+          <a:bodyPr/>
+          <a:lstStyle/>
+          <a:p>
+            <a:endParaRPr lang="en-US" dirty="0"/>
+          </a:p>
+        </p:txBody>
+      </p:sp>
+      <p:sp>
+        <p:nvSpPr>
+          <p:cNvPr id="7" name="Slide Number Placeholder 5">
+            <a:extLst>
+              <a:ext uri="{FF2B5EF4-FFF2-40B4-BE49-F238E27FC236}">
+                <a16:creationId xmlns:a16="http://schemas.microsoft.com/office/drawing/2014/main" id="{5049B984-F964-47FF-8179-0A3007CE21CD}"/>
+              </a:ext>
+            </a:extLst>
+          </p:cNvPr>
+          <p:cNvSpPr txBox="1">
+            <a:spLocks/>
+          </p:cNvSpPr>
+          <p:nvPr/>
+        </p:nvSpPr>
+        <p:spPr>
+          <a:xfrm>
+            <a:off x="6488999" y="8847000"/>
+            <a:ext cx="367414" cy="297000"/>
+          </a:xfrm>
+          <a:prstGeom prst="rect">
+            <a:avLst/>
+          </a:prstGeom>
+        </p:spPr>
+        <p:txBody>
+          <a:bodyPr vert="horz" lIns="91440" tIns="45720" rIns="91440" bIns="45720" rtlCol="0" anchor="b"/>
+          <a:lstStyle>
+            <a:defPPr>
+              <a:defRPr lang="en-US"/>
+            </a:defPPr>
+            <a:lvl1pPr marL="0" algn="r" defTabSz="914400" rtl="0" eaLnBrk="1" latinLnBrk="0" hangingPunct="1">
+              <a:defRPr sz="1200" kern="1200">
+                <a:solidFill>
+                  <a:schemeClr val="tx1"/>
+                </a:solidFill>
+                <a:latin typeface="+mn-lt"/>
+                <a:ea typeface="+mn-ea"/>
+                <a:cs typeface="+mn-cs"/>
+              </a:defRPr>
+            </a:lvl1pPr>
+            <a:lvl2pPr marL="457200" algn="l" defTabSz="914400" rtl="0" eaLnBrk="1" latinLnBrk="0" hangingPunct="1">
+              <a:defRPr sz="1800" kern="1200">
+                <a:solidFill>
+                  <a:schemeClr val="tx1"/>
+                </a:solidFill>
+                <a:latin typeface="+mn-lt"/>
+                <a:ea typeface="+mn-ea"/>
+                <a:cs typeface="+mn-cs"/>
+              </a:defRPr>
+            </a:lvl2pPr>
+            <a:lvl3pPr marL="914400" algn="l" defTabSz="914400" rtl="0" eaLnBrk="1" latinLnBrk="0" hangingPunct="1">
+              <a:defRPr sz="1800" kern="1200">
+                <a:solidFill>
+                  <a:schemeClr val="tx1"/>
+                </a:solidFill>
+                <a:latin typeface="+mn-lt"/>
+                <a:ea typeface="+mn-ea"/>
+                <a:cs typeface="+mn-cs"/>
+              </a:defRPr>
+            </a:lvl3pPr>
+            <a:lvl4pPr marL="1371600" algn="l" defTabSz="914400" rtl="0" eaLnBrk="1" latinLnBrk="0" hangingPunct="1">
+              <a:defRPr sz="1800" kern="1200">
+                <a:solidFill>
+                  <a:schemeClr val="tx1"/>
+                </a:solidFill>
+                <a:latin typeface="+mn-lt"/>
+                <a:ea typeface="+mn-ea"/>
+                <a:cs typeface="+mn-cs"/>
+              </a:defRPr>
+            </a:lvl4pPr>
+            <a:lvl5pPr marL="1828800" algn="l" defTabSz="914400" rtl="0" eaLnBrk="1" latinLnBrk="0" hangingPunct="1">
+              <a:defRPr sz="1800" kern="1200">
+                <a:solidFill>
+                  <a:schemeClr val="tx1"/>
+                </a:solidFill>
+                <a:latin typeface="+mn-lt"/>
+                <a:ea typeface="+mn-ea"/>
+                <a:cs typeface="+mn-cs"/>
+              </a:defRPr>
+            </a:lvl5pPr>
+            <a:lvl6pPr marL="2286000" algn="l" defTabSz="914400" rtl="0" eaLnBrk="1" latinLnBrk="0" hangingPunct="1">
+              <a:defRPr sz="1800" kern="1200">
+                <a:solidFill>
+                  <a:schemeClr val="tx1"/>
+                </a:solidFill>
+                <a:latin typeface="+mn-lt"/>
+                <a:ea typeface="+mn-ea"/>
+                <a:cs typeface="+mn-cs"/>
+              </a:defRPr>
+            </a:lvl6pPr>
+            <a:lvl7pPr marL="2743200" algn="l" defTabSz="914400" rtl="0" eaLnBrk="1" latinLnBrk="0" hangingPunct="1">
+              <a:defRPr sz="1800" kern="1200">
+                <a:solidFill>
+                  <a:schemeClr val="tx1"/>
+                </a:solidFill>
+                <a:latin typeface="+mn-lt"/>
+                <a:ea typeface="+mn-ea"/>
+                <a:cs typeface="+mn-cs"/>
+              </a:defRPr>
+            </a:lvl7pPr>
+            <a:lvl8pPr marL="3200400" algn="l" defTabSz="914400" rtl="0" eaLnBrk="1" latinLnBrk="0" hangingPunct="1">
+              <a:defRPr sz="1800" kern="1200">
+                <a:solidFill>
+                  <a:schemeClr val="tx1"/>
+                </a:solidFill>
+                <a:latin typeface="+mn-lt"/>
+                <a:ea typeface="+mn-ea"/>
+                <a:cs typeface="+mn-cs"/>
+              </a:defRPr>
+            </a:lvl8pPr>
+            <a:lvl9pPr marL="3657600" algn="l" defTabSz="914400" rtl="0" eaLnBrk="1" latinLnBrk="0" hangingPunct="1">
+              <a:defRPr sz="1800" kern="1200">
+                <a:solidFill>
+                  <a:schemeClr val="tx1"/>
+                </a:solidFill>
+                <a:latin typeface="+mn-lt"/>
+                <a:ea typeface="+mn-ea"/>
+                <a:cs typeface="+mn-cs"/>
+              </a:defRPr>
+            </a:lvl9pPr>
+          </a:lstStyle>
+          <a:p>
+            <a:fld id="{3EBA5BD7-F043-4D1B-AA17-CD412FC534DE}" type="slidenum">
+              <a:rPr lang="en-US" smtClean="0"/>
+              <a:pPr/>
               <a:t>35</a:t>
             </a:fld>
             <a:endParaRPr lang="en-US" dirty="0"/>
@@ -6957,7 +7187,7 @@
 </p:notes>
 </file>
 
-<file path=ppt/notesSlides/notesSlide34.xml><?xml version="1.0" encoding="utf-8"?>
+<file path=ppt/notesSlides/notesSlide35.xml><?xml version="1.0" encoding="utf-8"?>
 <p:notes xmlns:a="http://schemas.openxmlformats.org/drawingml/2006/main" xmlns:r="http://schemas.openxmlformats.org/officeDocument/2006/relationships" xmlns:p="http://schemas.openxmlformats.org/presentationml/2006/main">
   <p:cSld>
     <p:spTree>
@@ -7461,135 +7691,28 @@
           <a:bodyPr/>
           <a:lstStyle/>
           <a:p>
-            <a:endParaRPr lang="en-US"/>
+            <a:endParaRPr lang="en-BG" dirty="0"/>
           </a:p>
         </p:txBody>
       </p:sp>
       <p:sp>
         <p:nvSpPr>
-          <p:cNvPr id="7" name="Slide Number Placeholder 5">
-            <a:extLst>
-              <a:ext uri="{FF2B5EF4-FFF2-40B4-BE49-F238E27FC236}">
-                <a16:creationId xmlns:a16="http://schemas.microsoft.com/office/drawing/2014/main" id="{BD88B0D8-949C-482D-990A-2DAB14AD4AD1}"/>
-              </a:ext>
-            </a:extLst>
-          </p:cNvPr>
-          <p:cNvSpPr txBox="1">
-            <a:spLocks/>
+          <p:cNvPr id="4" name="Slide Number Placeholder 3"/>
+          <p:cNvSpPr>
+            <a:spLocks noGrp="1"/>
           </p:cNvSpPr>
-          <p:nvPr/>
-        </p:nvSpPr>
-        <p:spPr>
-          <a:xfrm>
-            <a:off x="6488999" y="8847000"/>
-            <a:ext cx="367414" cy="297000"/>
-          </a:xfrm>
-          <a:prstGeom prst="rect">
-            <a:avLst/>
-          </a:prstGeom>
-        </p:spPr>
+          <p:nvPr>
+            <p:ph type="sldNum" sz="quarter" idx="5"/>
+          </p:nvPr>
+        </p:nvSpPr>
+        <p:spPr/>
         <p:txBody>
-          <a:bodyPr vert="horz" lIns="91440" tIns="45720" rIns="91440" bIns="45720" rtlCol="0" anchor="b"/>
-          <a:lstStyle>
-            <a:defPPr>
-              <a:defRPr lang="en-US"/>
-            </a:defPPr>
-            <a:lvl1pPr marL="0" algn="r" defTabSz="914400" rtl="0" eaLnBrk="1" latinLnBrk="0" hangingPunct="1">
-              <a:defRPr sz="1200" kern="1200">
-                <a:solidFill>
-                  <a:schemeClr val="tx1"/>
-                </a:solidFill>
-                <a:latin typeface="+mn-lt"/>
-                <a:ea typeface="+mn-ea"/>
-                <a:cs typeface="+mn-cs"/>
-              </a:defRPr>
-            </a:lvl1pPr>
-            <a:lvl2pPr marL="457200" algn="l" defTabSz="914400" rtl="0" eaLnBrk="1" latinLnBrk="0" hangingPunct="1">
-              <a:defRPr sz="1800" kern="1200">
-                <a:solidFill>
-                  <a:schemeClr val="tx1"/>
-                </a:solidFill>
-                <a:latin typeface="+mn-lt"/>
-                <a:ea typeface="+mn-ea"/>
-                <a:cs typeface="+mn-cs"/>
-              </a:defRPr>
-            </a:lvl2pPr>
-            <a:lvl3pPr marL="914400" algn="l" defTabSz="914400" rtl="0" eaLnBrk="1" latinLnBrk="0" hangingPunct="1">
-              <a:defRPr sz="1800" kern="1200">
-                <a:solidFill>
-                  <a:schemeClr val="tx1"/>
-                </a:solidFill>
-                <a:latin typeface="+mn-lt"/>
-                <a:ea typeface="+mn-ea"/>
-                <a:cs typeface="+mn-cs"/>
-              </a:defRPr>
-            </a:lvl3pPr>
-            <a:lvl4pPr marL="1371600" algn="l" defTabSz="914400" rtl="0" eaLnBrk="1" latinLnBrk="0" hangingPunct="1">
-              <a:defRPr sz="1800" kern="1200">
-                <a:solidFill>
-                  <a:schemeClr val="tx1"/>
-                </a:solidFill>
-                <a:latin typeface="+mn-lt"/>
-                <a:ea typeface="+mn-ea"/>
-                <a:cs typeface="+mn-cs"/>
-              </a:defRPr>
-            </a:lvl4pPr>
-            <a:lvl5pPr marL="1828800" algn="l" defTabSz="914400" rtl="0" eaLnBrk="1" latinLnBrk="0" hangingPunct="1">
-              <a:defRPr sz="1800" kern="1200">
-                <a:solidFill>
-                  <a:schemeClr val="tx1"/>
-                </a:solidFill>
-                <a:latin typeface="+mn-lt"/>
-                <a:ea typeface="+mn-ea"/>
-                <a:cs typeface="+mn-cs"/>
-              </a:defRPr>
-            </a:lvl5pPr>
-            <a:lvl6pPr marL="2286000" algn="l" defTabSz="914400" rtl="0" eaLnBrk="1" latinLnBrk="0" hangingPunct="1">
-              <a:defRPr sz="1800" kern="1200">
-                <a:solidFill>
-                  <a:schemeClr val="tx1"/>
-                </a:solidFill>
-                <a:latin typeface="+mn-lt"/>
-                <a:ea typeface="+mn-ea"/>
-                <a:cs typeface="+mn-cs"/>
-              </a:defRPr>
-            </a:lvl6pPr>
-            <a:lvl7pPr marL="2743200" algn="l" defTabSz="914400" rtl="0" eaLnBrk="1" latinLnBrk="0" hangingPunct="1">
-              <a:defRPr sz="1800" kern="1200">
-                <a:solidFill>
-                  <a:schemeClr val="tx1"/>
-                </a:solidFill>
-                <a:latin typeface="+mn-lt"/>
-                <a:ea typeface="+mn-ea"/>
-                <a:cs typeface="+mn-cs"/>
-              </a:defRPr>
-            </a:lvl7pPr>
-            <a:lvl8pPr marL="3200400" algn="l" defTabSz="914400" rtl="0" eaLnBrk="1" latinLnBrk="0" hangingPunct="1">
-              <a:defRPr sz="1800" kern="1200">
-                <a:solidFill>
-                  <a:schemeClr val="tx1"/>
-                </a:solidFill>
-                <a:latin typeface="+mn-lt"/>
-                <a:ea typeface="+mn-ea"/>
-                <a:cs typeface="+mn-cs"/>
-              </a:defRPr>
-            </a:lvl8pPr>
-            <a:lvl9pPr marL="3657600" algn="l" defTabSz="914400" rtl="0" eaLnBrk="1" latinLnBrk="0" hangingPunct="1">
-              <a:defRPr sz="1800" kern="1200">
-                <a:solidFill>
-                  <a:schemeClr val="tx1"/>
-                </a:solidFill>
-                <a:latin typeface="+mn-lt"/>
-                <a:ea typeface="+mn-ea"/>
-                <a:cs typeface="+mn-cs"/>
-              </a:defRPr>
-            </a:lvl9pPr>
-          </a:lstStyle>
-          <a:p>
-            <a:fld id="{3EBA5BD7-F043-4D1B-AA17-CD412FC534DE}" type="slidenum">
+          <a:bodyPr/>
+          <a:lstStyle/>
+          <a:p>
+            <a:fld id="{2BF067CD-8E6B-4360-9AA8-C5DF2A48A6D1}" type="slidenum">
               <a:rPr lang="en-US" smtClean="0"/>
-              <a:pPr/>
-              <a:t>7</a:t>
+              <a:t>6</a:t>
             </a:fld>
             <a:endParaRPr lang="en-US" dirty="0"/>
           </a:p>
@@ -7597,13 +7720,7 @@
       </p:sp>
       <p:sp>
         <p:nvSpPr>
-          <p:cNvPr id="4" name="Footer Placeholder 3">
-            <a:extLst>
-              <a:ext uri="{FF2B5EF4-FFF2-40B4-BE49-F238E27FC236}">
-                <a16:creationId xmlns:a16="http://schemas.microsoft.com/office/drawing/2014/main" id="{58474633-D38D-4432-867B-70F325FA7016}"/>
-              </a:ext>
-            </a:extLst>
-          </p:cNvPr>
+          <p:cNvPr id="5" name="Footer Placeholder 4"/>
           <p:cNvSpPr>
             <a:spLocks noGrp="1"/>
           </p:cNvSpPr>
@@ -7617,27 +7734,31 @@
           <a:lstStyle/>
           <a:p>
             <a:r>
-              <a:rPr lang="en-US"/>
-              <a:t>© SoftUni – </a:t>
-            </a:r>
-            <a:r>
-              <a:rPr lang="en-US" u="sng">
+              <a:rPr lang="bg-BG" sz="1100"/>
+              <a:t>Работна група </a:t>
+            </a:r>
+            <a:r>
+              <a:rPr lang="bg-BG"/>
+              <a:t>"Образование по програмиране и ИТ"</a:t>
+            </a:r>
+            <a:r>
+              <a:rPr lang="bg-BG" sz="1100"/>
+              <a:t>, с подкрепата на </a:t>
+            </a:r>
+            <a:r>
+              <a:rPr lang="en-US" sz="1100">
                 <a:hlinkClick r:id="rId3"/>
               </a:rPr>
-              <a:t>https://softuni.org</a:t>
-            </a:r>
-            <a:r>
-              <a:rPr lang="en-US"/>
-              <a:t>. Copyrighted document. Unauthorized copy or reproduction is not permitted.</a:t>
-            </a:r>
-            <a:endParaRPr lang="en-US" dirty="0"/>
+              <a:t>SoftUni</a:t>
+            </a:r>
+            <a:endParaRPr lang="en-US" sz="1100" dirty="0"/>
           </a:p>
         </p:txBody>
       </p:sp>
     </p:spTree>
     <p:extLst>
       <p:ext uri="{BB962C8B-B14F-4D97-AF65-F5344CB8AC3E}">
-        <p14:creationId xmlns:p14="http://schemas.microsoft.com/office/powerpoint/2010/main" val="382771432"/>
+        <p14:creationId xmlns:p14="http://schemas.microsoft.com/office/powerpoint/2010/main" val="4042086559"/>
       </p:ext>
     </p:extLst>
   </p:cSld>
@@ -7697,10 +7818,10 @@
       </p:sp>
       <p:sp>
         <p:nvSpPr>
-          <p:cNvPr id="6" name="Slide Number Placeholder 5">
+          <p:cNvPr id="7" name="Slide Number Placeholder 5">
             <a:extLst>
               <a:ext uri="{FF2B5EF4-FFF2-40B4-BE49-F238E27FC236}">
-                <a16:creationId xmlns:a16="http://schemas.microsoft.com/office/drawing/2014/main" id="{973EF363-177A-44DE-80E9-FC9248B7DCA2}"/>
+                <a16:creationId xmlns:a16="http://schemas.microsoft.com/office/drawing/2014/main" id="{BD88B0D8-949C-482D-990A-2DAB14AD4AD1}"/>
               </a:ext>
             </a:extLst>
           </p:cNvPr>
@@ -7819,7 +7940,7 @@
             <a:fld id="{3EBA5BD7-F043-4D1B-AA17-CD412FC534DE}" type="slidenum">
               <a:rPr lang="en-US" smtClean="0"/>
               <a:pPr/>
-              <a:t>8</a:t>
+              <a:t>7</a:t>
             </a:fld>
             <a:endParaRPr lang="en-US" dirty="0"/>
           </a:p>
@@ -7830,7 +7951,7 @@
           <p:cNvPr id="4" name="Footer Placeholder 3">
             <a:extLst>
               <a:ext uri="{FF2B5EF4-FFF2-40B4-BE49-F238E27FC236}">
-                <a16:creationId xmlns:a16="http://schemas.microsoft.com/office/drawing/2014/main" id="{8EE613EE-6697-4964-A067-C2136C00C834}"/>
+                <a16:creationId xmlns:a16="http://schemas.microsoft.com/office/drawing/2014/main" id="{58474633-D38D-4432-867B-70F325FA7016}"/>
               </a:ext>
             </a:extLst>
           </p:cNvPr>
@@ -7867,7 +7988,7 @@
     </p:spTree>
     <p:extLst>
       <p:ext uri="{BB962C8B-B14F-4D97-AF65-F5344CB8AC3E}">
-        <p14:creationId xmlns:p14="http://schemas.microsoft.com/office/powerpoint/2010/main" val="1276311551"/>
+        <p14:creationId xmlns:p14="http://schemas.microsoft.com/office/powerpoint/2010/main" val="382771432"/>
       </p:ext>
     </p:extLst>
   </p:cSld>
@@ -7921,7 +8042,7 @@
           <a:bodyPr/>
           <a:lstStyle/>
           <a:p>
-            <a:endParaRPr lang="en-US"/>
+            <a:endParaRPr lang="en-US" dirty="0"/>
           </a:p>
         </p:txBody>
       </p:sp>
@@ -8049,7 +8170,7 @@
             <a:fld id="{3EBA5BD7-F043-4D1B-AA17-CD412FC534DE}" type="slidenum">
               <a:rPr lang="en-US" smtClean="0"/>
               <a:pPr/>
-              <a:t>9</a:t>
+              <a:t>8</a:t>
             </a:fld>
             <a:endParaRPr lang="en-US" dirty="0"/>
           </a:p>
@@ -8097,7 +8218,7 @@
     </p:spTree>
     <p:extLst>
       <p:ext uri="{BB962C8B-B14F-4D97-AF65-F5344CB8AC3E}">
-        <p14:creationId xmlns:p14="http://schemas.microsoft.com/office/powerpoint/2010/main" val="2869599998"/>
+        <p14:creationId xmlns:p14="http://schemas.microsoft.com/office/powerpoint/2010/main" val="1276311551"/>
       </p:ext>
     </p:extLst>
   </p:cSld>
@@ -8151,7 +8272,7 @@
           <a:bodyPr/>
           <a:lstStyle/>
           <a:p>
-            <a:endParaRPr lang="en-US"/>
+            <a:endParaRPr lang="en-US" dirty="0"/>
           </a:p>
         </p:txBody>
       </p:sp>
@@ -8279,7 +8400,7 @@
             <a:fld id="{3EBA5BD7-F043-4D1B-AA17-CD412FC534DE}" type="slidenum">
               <a:rPr lang="en-US" smtClean="0"/>
               <a:pPr/>
-              <a:t>10</a:t>
+              <a:t>9</a:t>
             </a:fld>
             <a:endParaRPr lang="en-US" dirty="0"/>
           </a:p>
@@ -8327,7 +8448,7 @@
     </p:spTree>
     <p:extLst>
       <p:ext uri="{BB962C8B-B14F-4D97-AF65-F5344CB8AC3E}">
-        <p14:creationId xmlns:p14="http://schemas.microsoft.com/office/powerpoint/2010/main" val="2143125317"/>
+        <p14:creationId xmlns:p14="http://schemas.microsoft.com/office/powerpoint/2010/main" val="2869599998"/>
       </p:ext>
     </p:extLst>
   </p:cSld>
@@ -8509,7 +8630,7 @@
             <a:fld id="{3EBA5BD7-F043-4D1B-AA17-CD412FC534DE}" type="slidenum">
               <a:rPr lang="en-US" smtClean="0"/>
               <a:pPr/>
-              <a:t>11</a:t>
+              <a:t>10</a:t>
             </a:fld>
             <a:endParaRPr lang="en-US" dirty="0"/>
           </a:p>
@@ -8557,7 +8678,7 @@
     </p:spTree>
     <p:extLst>
       <p:ext uri="{BB962C8B-B14F-4D97-AF65-F5344CB8AC3E}">
-        <p14:creationId xmlns:p14="http://schemas.microsoft.com/office/powerpoint/2010/main" val="986854748"/>
+        <p14:creationId xmlns:p14="http://schemas.microsoft.com/office/powerpoint/2010/main" val="2143125317"/>
       </p:ext>
     </p:extLst>
   </p:cSld>
@@ -14100,7 +14221,7 @@
             <a:pPr lvl="1"/>
             <a:r>
               <a:rPr lang="bg-BG" sz="3000" dirty="0"/>
-              <a:t>Включва управление на </a:t>
+              <a:t>Включва </a:t>
             </a:r>
             <a:r>
               <a:rPr lang="bg-BG" sz="3000" b="1" dirty="0">
@@ -14108,6 +14229,14 @@
                   <a:schemeClr val="bg1"/>
                 </a:solidFill>
               </a:rPr>
+              <a:t>управление</a:t>
+            </a:r>
+            <a:r>
+              <a:rPr lang="bg-BG" sz="3000" dirty="0"/>
+              <a:t> на </a:t>
+            </a:r>
+            <a:r>
+              <a:rPr lang="bg-BG" sz="3000" b="1" dirty="0"/>
               <a:t>данни</a:t>
             </a:r>
             <a:r>
@@ -14115,11 +14244,7 @@
               <a:t>, </a:t>
             </a:r>
             <a:r>
-              <a:rPr lang="bg-BG" sz="3000" b="1" dirty="0">
-                <a:solidFill>
-                  <a:schemeClr val="bg1"/>
-                </a:solidFill>
-              </a:rPr>
+              <a:rPr lang="bg-BG" sz="3000" b="1" dirty="0"/>
               <a:t>документи</a:t>
             </a:r>
             <a:r>
@@ -14127,11 +14252,7 @@
               <a:t>, </a:t>
             </a:r>
             <a:r>
-              <a:rPr lang="bg-BG" sz="3000" b="1" dirty="0">
-                <a:solidFill>
-                  <a:schemeClr val="bg1"/>
-                </a:solidFill>
-              </a:rPr>
+              <a:rPr lang="bg-BG" sz="3000" b="1" dirty="0"/>
               <a:t>електронни ресурси </a:t>
             </a:r>
             <a:r>
@@ -14139,11 +14260,7 @@
               <a:t>и други </a:t>
             </a:r>
             <a:r>
-              <a:rPr lang="bg-BG" sz="3000" b="1" dirty="0">
-                <a:solidFill>
-                  <a:schemeClr val="bg1"/>
-                </a:solidFill>
-              </a:rPr>
+              <a:rPr lang="bg-BG" sz="3000" b="1" dirty="0"/>
               <a:t>информационни активи</a:t>
             </a:r>
           </a:p>
@@ -14592,7 +14709,7 @@
             </a:pPr>
             <a:r>
               <a:rPr lang="bg-BG" sz="3000" dirty="0"/>
-              <a:t>Софтуерен продукт, позволяващ да се </a:t>
+              <a:t>Софтуерен продукт за </a:t>
             </a:r>
             <a:r>
               <a:rPr lang="bg-BG" sz="3000" b="1" dirty="0">
@@ -14600,7 +14717,7 @@
                   <a:schemeClr val="bg1"/>
                 </a:solidFill>
               </a:rPr>
-              <a:t>създават</a:t>
+              <a:t>създаване</a:t>
             </a:r>
             <a:r>
               <a:rPr lang="bg-BG" sz="3000" dirty="0"/>
@@ -14612,7 +14729,7 @@
                   <a:schemeClr val="bg1"/>
                 </a:solidFill>
               </a:rPr>
-              <a:t>управляват</a:t>
+              <a:t>управляване</a:t>
             </a:r>
             <a:r>
               <a:rPr lang="bg-BG" sz="3000" dirty="0"/>
@@ -14624,14 +14741,26 @@
                   <a:schemeClr val="bg1"/>
                 </a:solidFill>
               </a:rPr>
-              <a:t>манипулират бази данни</a:t>
+              <a:t>манипулиране </a:t>
+            </a:r>
+            <a:r>
+              <a:rPr lang="bg-BG" sz="3000" dirty="0"/>
+              <a:t>на</a:t>
+            </a:r>
+            <a:r>
+              <a:rPr lang="bg-BG" sz="3000" b="1" dirty="0">
+                <a:solidFill>
+                  <a:schemeClr val="bg1"/>
+                </a:solidFill>
+              </a:rPr>
+              <a:t> бази данни</a:t>
             </a:r>
           </a:p>
           <a:p>
             <a:pPr lvl="1"/>
             <a:r>
               <a:rPr lang="bg-BG" sz="3000" dirty="0"/>
-              <a:t>Предоставят </a:t>
+              <a:t>Предоставя </a:t>
             </a:r>
             <a:r>
               <a:rPr lang="bg-BG" sz="3000" b="1" dirty="0">
@@ -14643,7 +14772,7 @@
             </a:r>
             <a:r>
               <a:rPr lang="bg-BG" sz="3000" dirty="0"/>
-              <a:t>, чрез който потребителите могат да извършват различни </a:t>
+              <a:t> за извършване на различни </a:t>
             </a:r>
             <a:r>
               <a:rPr lang="bg-BG" sz="3000" b="1" dirty="0">
@@ -15089,73 +15218,6 @@
             <a:pPr lvl="1"/>
             <a:r>
               <a:rPr lang="bg-BG" sz="3000" dirty="0"/>
-              <a:t>Прилага различни </a:t>
-            </a:r>
-            <a:r>
-              <a:rPr lang="bg-BG" sz="3000" b="1" dirty="0">
-                <a:solidFill>
-                  <a:schemeClr val="bg1"/>
-                </a:solidFill>
-              </a:rPr>
-              <a:t>мерки</a:t>
-            </a:r>
-            <a:r>
-              <a:rPr lang="bg-BG" sz="3000" dirty="0"/>
-              <a:t> и </a:t>
-            </a:r>
-            <a:r>
-              <a:rPr lang="bg-BG" sz="3000" b="1" dirty="0">
-                <a:solidFill>
-                  <a:schemeClr val="bg1"/>
-                </a:solidFill>
-              </a:rPr>
-              <a:t>контроли</a:t>
-            </a:r>
-            <a:r>
-              <a:rPr lang="bg-BG" sz="3000" dirty="0"/>
-              <a:t>, които осигуряват </a:t>
-            </a:r>
-            <a:r>
-              <a:rPr lang="bg-BG" sz="3000" b="1" dirty="0">
-                <a:solidFill>
-                  <a:schemeClr val="bg1"/>
-                </a:solidFill>
-              </a:rPr>
-              <a:t>поверителност</a:t>
-            </a:r>
-            <a:r>
-              <a:rPr lang="bg-BG" sz="3000" dirty="0"/>
-              <a:t>, </a:t>
-            </a:r>
-            <a:r>
-              <a:rPr lang="bg-BG" sz="3000" b="1" dirty="0">
-                <a:solidFill>
-                  <a:schemeClr val="bg1"/>
-                </a:solidFill>
-              </a:rPr>
-              <a:t>цялостност</a:t>
-            </a:r>
-            <a:r>
-              <a:rPr lang="bg-BG" sz="3000" dirty="0"/>
-              <a:t> и </a:t>
-            </a:r>
-            <a:r>
-              <a:rPr lang="bg-BG" sz="3000" b="1" dirty="0">
-                <a:solidFill>
-                  <a:schemeClr val="bg1"/>
-                </a:solidFill>
-              </a:rPr>
-              <a:t>наличност</a:t>
-            </a:r>
-            <a:r>
-              <a:rPr lang="bg-BG" sz="3000" dirty="0"/>
-              <a:t> на информацията</a:t>
-            </a:r>
-          </a:p>
-          <a:p>
-            <a:pPr lvl="1"/>
-            <a:r>
-              <a:rPr lang="bg-BG" sz="3000" dirty="0"/>
               <a:t>Използва </a:t>
             </a:r>
             <a:r>
@@ -15256,8 +15318,8 @@
         </p:blipFill>
         <p:spPr>
           <a:xfrm>
-            <a:off x="5436356" y="4509000"/>
-            <a:ext cx="1319289" cy="2049490"/>
+            <a:off x="5338678" y="4154030"/>
+            <a:ext cx="1514644" cy="2352970"/>
           </a:xfrm>
           <a:prstGeom prst="rect">
             <a:avLst/>
@@ -15449,55 +15511,6 @@
                       </p:childTnLst>
                     </p:cTn>
                   </p:par>
-                  <p:par>
-                    <p:cTn id="15" fill="hold">
-                      <p:stCondLst>
-                        <p:cond delay="indefinite"/>
-                      </p:stCondLst>
-                      <p:childTnLst>
-                        <p:par>
-                          <p:cTn id="16" fill="hold">
-                            <p:stCondLst>
-                              <p:cond delay="0"/>
-                            </p:stCondLst>
-                            <p:childTnLst>
-                              <p:par>
-                                <p:cTn id="17" presetID="1" presetClass="entr" presetSubtype="0" fill="hold" nodeType="clickEffect">
-                                  <p:stCondLst>
-                                    <p:cond delay="0"/>
-                                  </p:stCondLst>
-                                  <p:childTnLst>
-                                    <p:set>
-                                      <p:cBhvr>
-                                        <p:cTn id="18" dur="1" fill="hold">
-                                          <p:stCondLst>
-                                            <p:cond delay="0"/>
-                                          </p:stCondLst>
-                                        </p:cTn>
-                                        <p:tgtEl>
-                                          <p:spTgt spid="7">
-                                            <p:txEl>
-                                              <p:pRg st="3" end="3"/>
-                                            </p:txEl>
-                                          </p:spTgt>
-                                        </p:tgtEl>
-                                        <p:attrNameLst>
-                                          <p:attrName>style.visibility</p:attrName>
-                                        </p:attrNameLst>
-                                      </p:cBhvr>
-                                      <p:to>
-                                        <p:strVal val="visible"/>
-                                      </p:to>
-                                    </p:set>
-                                  </p:childTnLst>
-                                </p:cTn>
-                              </p:par>
-                            </p:childTnLst>
-                          </p:cTn>
-                        </p:par>
-                      </p:childTnLst>
-                    </p:cTn>
-                  </p:par>
                 </p:childTnLst>
               </p:cTn>
               <p:prevCondLst>
@@ -15668,7 +15681,7 @@
             <a:pPr lvl="1"/>
             <a:r>
               <a:rPr lang="bg-BG" sz="3000" dirty="0"/>
-              <a:t>Свързват </a:t>
+              <a:t>Свързва </a:t>
             </a:r>
             <a:r>
               <a:rPr lang="bg-BG" sz="3000" b="1" dirty="0">
@@ -15683,11 +15696,7 @@
               <a:t> като </a:t>
             </a:r>
             <a:r>
-              <a:rPr lang="bg-BG" sz="3000" b="1" dirty="0">
-                <a:solidFill>
-                  <a:schemeClr val="bg1"/>
-                </a:solidFill>
-              </a:rPr>
+              <a:rPr lang="bg-BG" sz="3000" b="1" dirty="0"/>
               <a:t>компютри</a:t>
             </a:r>
             <a:r>
@@ -15695,11 +15704,7 @@
               <a:t>, </a:t>
             </a:r>
             <a:r>
-              <a:rPr lang="bg-BG" sz="3000" b="1" dirty="0">
-                <a:solidFill>
-                  <a:schemeClr val="bg1"/>
-                </a:solidFill>
-              </a:rPr>
+              <a:rPr lang="bg-BG" sz="3000" b="1" dirty="0"/>
               <a:t>смартфони</a:t>
             </a:r>
             <a:r>
@@ -15707,11 +15712,7 @@
               <a:t>, </a:t>
             </a:r>
             <a:r>
-              <a:rPr lang="bg-BG" sz="3000" b="1" dirty="0">
-                <a:solidFill>
-                  <a:schemeClr val="bg1"/>
-                </a:solidFill>
-              </a:rPr>
+              <a:rPr lang="bg-BG" sz="3000" b="1" dirty="0"/>
               <a:t>принтери</a:t>
             </a:r>
             <a:r>
@@ -15719,11 +15720,7 @@
               <a:t>, </a:t>
             </a:r>
             <a:r>
-              <a:rPr lang="bg-BG" sz="3000" b="1" dirty="0">
-                <a:solidFill>
-                  <a:schemeClr val="bg1"/>
-                </a:solidFill>
-              </a:rPr>
+              <a:rPr lang="bg-BG" sz="3000" b="1" dirty="0"/>
               <a:t>сървъри</a:t>
             </a:r>
             <a:r>
@@ -15735,7 +15732,7 @@
             <a:pPr lvl="1"/>
             <a:r>
               <a:rPr lang="bg-BG" sz="3000" dirty="0"/>
-              <a:t>Осигуряват </a:t>
+              <a:t>Осигурява </a:t>
             </a:r>
             <a:r>
               <a:rPr lang="bg-BG" sz="3000" b="1" dirty="0">
@@ -15750,11 +15747,7 @@
               <a:t> до </a:t>
             </a:r>
             <a:r>
-              <a:rPr lang="bg-BG" sz="3000" b="1" dirty="0">
-                <a:solidFill>
-                  <a:schemeClr val="bg1"/>
-                </a:solidFill>
-              </a:rPr>
+              <a:rPr lang="bg-BG" sz="3000" b="1" dirty="0"/>
               <a:t>интернет</a:t>
             </a:r>
             <a:r>
@@ -15762,11 +15755,7 @@
               <a:t>, </a:t>
             </a:r>
             <a:r>
-              <a:rPr lang="bg-BG" sz="3000" b="1" dirty="0">
-                <a:solidFill>
-                  <a:schemeClr val="bg1"/>
-                </a:solidFill>
-              </a:rPr>
+              <a:rPr lang="bg-BG" sz="3000" b="1" dirty="0"/>
               <a:t>файлови сървъри</a:t>
             </a:r>
             <a:r>
@@ -15774,11 +15763,7 @@
               <a:t>, </a:t>
             </a:r>
             <a:r>
-              <a:rPr lang="bg-BG" sz="3000" b="1" dirty="0">
-                <a:solidFill>
-                  <a:schemeClr val="bg1"/>
-                </a:solidFill>
-              </a:rPr>
+              <a:rPr lang="bg-BG" sz="3000" b="1" dirty="0"/>
               <a:t>бази данни</a:t>
             </a:r>
             <a:r>
@@ -16343,11 +16328,7 @@
           <a:p>
             <a:pPr lvl="1"/>
             <a:r>
-              <a:rPr lang="bg-BG" sz="3000" b="1" dirty="0">
-                <a:solidFill>
-                  <a:schemeClr val="bg1"/>
-                </a:solidFill>
-              </a:rPr>
+              <a:rPr lang="bg-BG" sz="3000" b="1" dirty="0"/>
               <a:t>Компютри</a:t>
             </a:r>
             <a:r>
@@ -16355,11 +16336,7 @@
               <a:t>, </a:t>
             </a:r>
             <a:r>
-              <a:rPr lang="bg-BG" sz="3000" b="1" dirty="0">
-                <a:solidFill>
-                  <a:schemeClr val="bg1"/>
-                </a:solidFill>
-              </a:rPr>
+              <a:rPr lang="bg-BG" sz="3000" b="1" dirty="0"/>
               <a:t>сървъри</a:t>
             </a:r>
             <a:r>
@@ -16367,11 +16344,7 @@
               <a:t>, </a:t>
             </a:r>
             <a:r>
-              <a:rPr lang="bg-BG" sz="3000" b="1" dirty="0">
-                <a:solidFill>
-                  <a:schemeClr val="bg1"/>
-                </a:solidFill>
-              </a:rPr>
+              <a:rPr lang="bg-BG" sz="3000" b="1" dirty="0"/>
               <a:t>мрежови</a:t>
             </a:r>
             <a:r>
@@ -16379,11 +16352,7 @@
               <a:t> и </a:t>
             </a:r>
             <a:r>
-              <a:rPr lang="bg-BG" sz="3000" b="1" dirty="0">
-                <a:solidFill>
-                  <a:schemeClr val="bg1"/>
-                </a:solidFill>
-              </a:rPr>
+              <a:rPr lang="bg-BG" sz="3000" b="1" dirty="0"/>
               <a:t>периферни устройства</a:t>
             </a:r>
           </a:p>
@@ -16404,23 +16373,27 @@
           <a:p>
             <a:pPr lvl="1"/>
             <a:r>
+              <a:rPr lang="bg-BG" sz="3000" b="1" dirty="0"/>
+              <a:t>Операционни</a:t>
+            </a:r>
+            <a:r>
               <a:rPr lang="bg-BG" sz="3000" b="1" dirty="0">
                 <a:solidFill>
                   <a:schemeClr val="bg1"/>
                 </a:solidFill>
               </a:rPr>
-              <a:t>Операционни системи</a:t>
+              <a:t> </a:t>
+            </a:r>
+            <a:r>
+              <a:rPr lang="bg-BG" sz="3000" b="1" dirty="0"/>
+              <a:t>системи</a:t>
             </a:r>
             <a:r>
               <a:rPr lang="bg-BG" sz="3000" dirty="0"/>
               <a:t>, </a:t>
             </a:r>
             <a:r>
-              <a:rPr lang="bg-BG" sz="3000" b="1" dirty="0">
-                <a:solidFill>
-                  <a:schemeClr val="bg1"/>
-                </a:solidFill>
-              </a:rPr>
+              <a:rPr lang="bg-BG" sz="3000" b="1" dirty="0"/>
               <a:t>приложен софтуер </a:t>
             </a:r>
             <a:r>
@@ -16436,12 +16409,16 @@
               <a:t>, </a:t>
             </a:r>
             <a:r>
+              <a:rPr lang="bg-BG" sz="3000" b="1" dirty="0"/>
+              <a:t>системи за управление на бази данни</a:t>
+            </a:r>
+            <a:r>
               <a:rPr lang="bg-BG" sz="3000" b="1" dirty="0">
                 <a:solidFill>
                   <a:schemeClr val="bg1"/>
                 </a:solidFill>
               </a:rPr>
-              <a:t>системи за управление на бази данни </a:t>
+              <a:t> </a:t>
             </a:r>
             <a:r>
               <a:rPr lang="bg-BG" sz="3000" dirty="0"/>
@@ -16852,11 +16829,7 @@
           <a:p>
             <a:pPr lvl="1"/>
             <a:r>
-              <a:rPr lang="bg-BG" sz="3000" b="1" dirty="0">
-                <a:solidFill>
-                  <a:schemeClr val="bg1"/>
-                </a:solidFill>
-              </a:rPr>
+              <a:rPr lang="bg-BG" sz="3000" b="1" dirty="0"/>
               <a:t>Текстове</a:t>
             </a:r>
             <a:r>
@@ -16864,11 +16837,7 @@
               <a:t>, </a:t>
             </a:r>
             <a:r>
-              <a:rPr lang="bg-BG" sz="3000" b="1" dirty="0">
-                <a:solidFill>
-                  <a:schemeClr val="bg1"/>
-                </a:solidFill>
-              </a:rPr>
+              <a:rPr lang="bg-BG" sz="3000" b="1" dirty="0"/>
               <a:t>числа</a:t>
             </a:r>
             <a:r>
@@ -16876,11 +16845,7 @@
               <a:t>, </a:t>
             </a:r>
             <a:r>
-              <a:rPr lang="bg-BG" sz="3000" b="1" dirty="0">
-                <a:solidFill>
-                  <a:schemeClr val="bg1"/>
-                </a:solidFill>
-              </a:rPr>
+              <a:rPr lang="bg-BG" sz="3000" b="1" dirty="0"/>
               <a:t>изображения</a:t>
             </a:r>
             <a:r>
@@ -16893,11 +16858,7 @@
                   <a:schemeClr val="bg1"/>
                 </a:solidFill>
               </a:rPr>
-              <a:t>форми</a:t>
-            </a:r>
-            <a:r>
-              <a:rPr lang="bg-BG" sz="3000" dirty="0"/>
-              <a:t> на информация</a:t>
+              <a:t>форми на информация</a:t>
             </a:r>
           </a:p>
           <a:p>
@@ -16913,8 +16874,20 @@
           <a:p>
             <a:pPr lvl="1"/>
             <a:r>
+              <a:rPr lang="bg-BG" sz="3000" b="1" dirty="0"/>
+              <a:t>Алгоритми</a:t>
+            </a:r>
+            <a:r>
               <a:rPr lang="bg-BG" sz="3000" dirty="0"/>
-              <a:t>Алгоритми и процеси за </a:t>
+              <a:t> и </a:t>
+            </a:r>
+            <a:r>
+              <a:rPr lang="bg-BG" sz="3000" b="1" dirty="0"/>
+              <a:t>процеси</a:t>
+            </a:r>
+            <a:r>
+              <a:rPr lang="bg-BG" sz="3000" dirty="0"/>
+              <a:t> за </a:t>
             </a:r>
             <a:r>
               <a:rPr lang="bg-BG" sz="3000" b="1" dirty="0">
@@ -17357,35 +17330,31 @@
           <a:p>
             <a:pPr lvl="1"/>
             <a:r>
-              <a:rPr lang="bg-BG" sz="3000" b="1" dirty="0">
-                <a:solidFill>
-                  <a:schemeClr val="bg1"/>
-                </a:solidFill>
-              </a:rPr>
+              <a:rPr lang="bg-BG" sz="3000" b="1" dirty="0"/>
               <a:t>Графични</a:t>
             </a:r>
             <a:r>
               <a:rPr lang="bg-BG" sz="3000" dirty="0"/>
-              <a:t> потребителски интерфейси, </a:t>
-            </a:r>
-            <a:r>
-              <a:rPr lang="bg-BG" sz="3000" b="1" dirty="0">
-                <a:solidFill>
-                  <a:schemeClr val="bg1"/>
-                </a:solidFill>
-              </a:rPr>
-              <a:t>текстови</a:t>
+              <a:t> </a:t>
+            </a:r>
+            <a:r>
+              <a:rPr lang="bg-BG" sz="3000" b="1" dirty="0"/>
+              <a:t>потребителски интерфейси</a:t>
             </a:r>
             <a:r>
               <a:rPr lang="bg-BG" sz="3000" dirty="0"/>
-              <a:t> интерфейси, </a:t>
-            </a:r>
-            <a:r>
-              <a:rPr lang="bg-BG" sz="3000" b="1" dirty="0">
-                <a:solidFill>
-                  <a:schemeClr val="bg1"/>
-                </a:solidFill>
-              </a:rPr>
+              <a:t>, </a:t>
+            </a:r>
+            <a:r>
+              <a:rPr lang="bg-BG" sz="3000" b="1" dirty="0"/>
+              <a:t>текстови интерфейси</a:t>
+            </a:r>
+            <a:r>
+              <a:rPr lang="bg-BG" sz="3000" dirty="0"/>
+              <a:t>, </a:t>
+            </a:r>
+            <a:r>
+              <a:rPr lang="bg-BG" sz="3000" b="1" dirty="0"/>
               <a:t>гласови команди </a:t>
             </a:r>
             <a:r>
@@ -17406,11 +17375,7 @@
           <a:p>
             <a:pPr lvl="1"/>
             <a:r>
-              <a:rPr lang="bg-BG" sz="3000" b="1" dirty="0">
-                <a:solidFill>
-                  <a:schemeClr val="bg1"/>
-                </a:solidFill>
-              </a:rPr>
+              <a:rPr lang="bg-BG" sz="3000" b="1" dirty="0"/>
               <a:t>Потребители</a:t>
             </a:r>
             <a:r>
@@ -17418,11 +17383,7 @@
               <a:t> и </a:t>
             </a:r>
             <a:r>
-              <a:rPr lang="bg-BG" sz="3000" b="1" dirty="0">
-                <a:solidFill>
-                  <a:schemeClr val="bg1"/>
-                </a:solidFill>
-              </a:rPr>
+              <a:rPr lang="bg-BG" sz="3000" b="1" dirty="0"/>
               <a:t>администратори</a:t>
             </a:r>
             <a:r>
@@ -19239,24 +19200,16 @@
               <a:t> системите </a:t>
             </a:r>
             <a:r>
-              <a:rPr lang="en-US" dirty="0"/>
+              <a:rPr lang="en-US" b="1" dirty="0"/>
               <a:t>(</a:t>
             </a:r>
             <a:r>
-              <a:rPr lang="en-GB" dirty="0"/>
+              <a:rPr lang="en-GB" b="1" dirty="0"/>
               <a:t>Management Information System</a:t>
             </a:r>
             <a:r>
-              <a:rPr lang="en-US" dirty="0"/>
-              <a:t>s)</a:t>
-            </a:r>
-            <a:r>
-              <a:rPr lang="en-US" b="1" dirty="0">
-                <a:solidFill>
-                  <a:schemeClr val="bg1"/>
-                </a:solidFill>
-              </a:rPr>
-              <a:t> </a:t>
+              <a:rPr lang="en-US" b="1" dirty="0"/>
+              <a:t>s) </a:t>
             </a:r>
             <a:r>
               <a:rPr lang="bg-BG" b="1" dirty="0">
@@ -20351,15 +20304,15 @@
               <a:t>системите </a:t>
             </a:r>
             <a:r>
-              <a:rPr lang="bg-BG" dirty="0"/>
+              <a:rPr lang="bg-BG" b="1" dirty="0"/>
               <a:t>(</a:t>
             </a:r>
             <a:r>
-              <a:rPr lang="en-GB" dirty="0"/>
+              <a:rPr lang="en-GB" b="1" dirty="0"/>
               <a:t>Enterprise Resource Planning</a:t>
             </a:r>
             <a:r>
-              <a:rPr lang="en-US" dirty="0"/>
+              <a:rPr lang="en-US" b="1" dirty="0"/>
               <a:t>) </a:t>
             </a:r>
             <a:r>
@@ -20399,11 +20352,7 @@
               <a:t> в една </a:t>
             </a:r>
             <a:r>
-              <a:rPr lang="bg-BG" b="1" dirty="0">
-                <a:solidFill>
-                  <a:schemeClr val="bg1"/>
-                </a:solidFill>
-              </a:rPr>
+              <a:rPr lang="bg-BG" b="1" dirty="0"/>
               <a:t>централизирана система </a:t>
             </a:r>
             <a:r>
@@ -20426,11 +20375,7 @@
               <a:t> информацията в организацията – </a:t>
             </a:r>
             <a:r>
-              <a:rPr lang="bg-BG" b="1" dirty="0">
-                <a:solidFill>
-                  <a:schemeClr val="bg1"/>
-                </a:solidFill>
-              </a:rPr>
+              <a:rPr lang="bg-BG" b="1" dirty="0"/>
               <a:t>финансови ресурси</a:t>
             </a:r>
             <a:r>
@@ -20438,11 +20383,7 @@
               <a:t>, </a:t>
             </a:r>
             <a:r>
-              <a:rPr lang="bg-BG" b="1" dirty="0">
-                <a:solidFill>
-                  <a:schemeClr val="bg1"/>
-                </a:solidFill>
-              </a:rPr>
+              <a:rPr lang="bg-BG" b="1" dirty="0"/>
               <a:t>производствен процес</a:t>
             </a:r>
             <a:r>
@@ -20450,11 +20391,7 @@
               <a:t>, </a:t>
             </a:r>
             <a:r>
-              <a:rPr lang="bg-BG" b="1" dirty="0">
-                <a:solidFill>
-                  <a:schemeClr val="bg1"/>
-                </a:solidFill>
-              </a:rPr>
+              <a:rPr lang="bg-BG" b="1" dirty="0"/>
               <a:t>инвентар</a:t>
             </a:r>
             <a:r>
@@ -20462,11 +20399,7 @@
               <a:t>, </a:t>
             </a:r>
             <a:r>
-              <a:rPr lang="bg-BG" b="1" dirty="0">
-                <a:solidFill>
-                  <a:schemeClr val="bg1"/>
-                </a:solidFill>
-              </a:rPr>
+              <a:rPr lang="bg-BG" b="1" dirty="0"/>
               <a:t>продажби</a:t>
             </a:r>
             <a:r>
@@ -21146,20 +21079,24 @@
               <a:t>системите </a:t>
             </a:r>
             <a:r>
-              <a:rPr lang="en-US" dirty="0"/>
+              <a:rPr lang="en-US" b="1" dirty="0"/>
               <a:t>(</a:t>
             </a:r>
             <a:r>
-              <a:rPr lang="en-GB" dirty="0"/>
+              <a:rPr lang="en-GB" b="1" dirty="0"/>
               <a:t>Customer Relationship Management</a:t>
             </a:r>
             <a:r>
-              <a:rPr lang="en-US" dirty="0"/>
+              <a:rPr lang="en-US" b="1" dirty="0"/>
               <a:t>)</a:t>
             </a:r>
             <a:r>
+              <a:rPr lang="bg-BG" b="1" dirty="0"/>
+              <a:t> </a:t>
+            </a:r>
+            <a:r>
               <a:rPr lang="bg-BG" dirty="0"/>
-              <a:t> се използват от организации за </a:t>
+              <a:t>се използват от организации за </a:t>
             </a:r>
             <a:r>
               <a:rPr lang="bg-BG" b="1" dirty="0">
@@ -21213,7 +21150,19 @@
           <a:p>
             <a:r>
               <a:rPr lang="bg-BG" dirty="0"/>
-              <a:t>Целта им е да подобряват </a:t>
+              <a:t>Целта им е да </a:t>
+            </a:r>
+            <a:r>
+              <a:rPr lang="bg-BG" b="1" dirty="0">
+                <a:solidFill>
+                  <a:schemeClr val="bg1"/>
+                </a:solidFill>
+              </a:rPr>
+              <a:t>подобряват</a:t>
+            </a:r>
+            <a:r>
+              <a:rPr lang="bg-BG" dirty="0"/>
+              <a:t> </a:t>
             </a:r>
             <a:r>
               <a:rPr lang="bg-BG" b="1" dirty="0">
@@ -21225,19 +21174,7 @@
             </a:r>
             <a:r>
               <a:rPr lang="bg-BG" dirty="0"/>
-              <a:t> </a:t>
-            </a:r>
-            <a:r>
-              <a:rPr lang="bg-BG" b="1" dirty="0">
-                <a:solidFill>
-                  <a:schemeClr val="bg1"/>
-                </a:solidFill>
-              </a:rPr>
-              <a:t>с клиентите</a:t>
-            </a:r>
-            <a:r>
-              <a:rPr lang="bg-BG" dirty="0"/>
-              <a:t>, да </a:t>
+              <a:t> с клиентите, да </a:t>
             </a:r>
             <a:r>
               <a:rPr lang="bg-BG" b="1" dirty="0">
@@ -21936,11 +21873,11 @@
               <a:t>системите </a:t>
             </a:r>
             <a:r>
-              <a:rPr lang="bg-BG" dirty="0"/>
+              <a:rPr lang="bg-BG" b="1" dirty="0"/>
               <a:t>(</a:t>
             </a:r>
             <a:r>
-              <a:rPr lang="en-GB" dirty="0"/>
+              <a:rPr lang="en-GB" b="1" dirty="0"/>
               <a:t>Project Management Systems) </a:t>
             </a:r>
             <a:r>
@@ -22698,15 +22635,15 @@
               <a:t>системите </a:t>
             </a:r>
             <a:r>
-              <a:rPr lang="bg-BG" dirty="0"/>
+              <a:rPr lang="bg-BG" b="1" dirty="0"/>
               <a:t>(</a:t>
             </a:r>
             <a:r>
-              <a:rPr lang="en-GB" dirty="0"/>
+              <a:rPr lang="en-GB" b="1" dirty="0"/>
               <a:t>Learning Management Systems</a:t>
             </a:r>
             <a:r>
-              <a:rPr lang="en-US" dirty="0"/>
+              <a:rPr lang="en-US" b="1" dirty="0"/>
               <a:t>) </a:t>
             </a:r>
             <a:r>
@@ -22726,11 +22663,7 @@
               <a:t> на </a:t>
             </a:r>
             <a:r>
-              <a:rPr lang="bg-BG" b="1" dirty="0">
-                <a:solidFill>
-                  <a:schemeClr val="bg1"/>
-                </a:solidFill>
-              </a:rPr>
+              <a:rPr lang="bg-BG" b="1" dirty="0"/>
               <a:t>учебни материали</a:t>
             </a:r>
             <a:r>
@@ -22738,11 +22671,7 @@
               <a:t>, </a:t>
             </a:r>
             <a:r>
-              <a:rPr lang="bg-BG" b="1" dirty="0">
-                <a:solidFill>
-                  <a:schemeClr val="bg1"/>
-                </a:solidFill>
-              </a:rPr>
+              <a:rPr lang="bg-BG" b="1" dirty="0"/>
               <a:t>курсове</a:t>
             </a:r>
             <a:r>
@@ -22750,11 +22679,7 @@
               <a:t>, </a:t>
             </a:r>
             <a:r>
-              <a:rPr lang="bg-BG" b="1" dirty="0">
-                <a:solidFill>
-                  <a:schemeClr val="bg1"/>
-                </a:solidFill>
-              </a:rPr>
+              <a:rPr lang="bg-BG" b="1" dirty="0"/>
               <a:t>тестове</a:t>
             </a:r>
             <a:r>
@@ -22774,11 +22699,7 @@
               <a:t> на </a:t>
             </a:r>
             <a:r>
-              <a:rPr lang="bg-BG" b="1" dirty="0">
-                <a:solidFill>
-                  <a:schemeClr val="bg1"/>
-                </a:solidFill>
-              </a:rPr>
+              <a:rPr lang="bg-BG" b="1" dirty="0"/>
               <a:t>напредъка</a:t>
             </a:r>
             <a:r>
@@ -22786,11 +22707,7 @@
               <a:t> на </a:t>
             </a:r>
             <a:r>
-              <a:rPr lang="bg-BG" b="1" dirty="0">
-                <a:solidFill>
-                  <a:schemeClr val="bg1"/>
-                </a:solidFill>
-              </a:rPr>
+              <a:rPr lang="bg-BG" b="1" dirty="0"/>
               <a:t>обучението</a:t>
             </a:r>
           </a:p>
@@ -23953,19 +23870,19 @@
               <a:t>системите </a:t>
             </a:r>
             <a:r>
-              <a:rPr lang="en-US" dirty="0"/>
+              <a:rPr lang="en-US" b="1" dirty="0"/>
               <a:t>(</a:t>
             </a:r>
             <a:r>
-              <a:rPr lang="en-GB" dirty="0"/>
+              <a:rPr lang="en-GB" b="1" dirty="0"/>
               <a:t>Human Resource Management Systems</a:t>
             </a:r>
             <a:r>
-              <a:rPr lang="bg-BG" dirty="0"/>
+              <a:rPr lang="bg-BG" b="1" dirty="0"/>
               <a:t>)</a:t>
             </a:r>
             <a:r>
-              <a:rPr lang="en-US" dirty="0"/>
+              <a:rPr lang="en-US" b="1" dirty="0"/>
               <a:t> </a:t>
             </a:r>
             <a:r>
@@ -24005,11 +23922,7 @@
               <a:t> на организацията, като </a:t>
             </a:r>
             <a:r>
-              <a:rPr lang="bg-BG" b="1" dirty="0">
-                <a:solidFill>
-                  <a:schemeClr val="bg1"/>
-                </a:solidFill>
-              </a:rPr>
+              <a:rPr lang="bg-BG" b="1" dirty="0"/>
               <a:t>персонални данни</a:t>
             </a:r>
             <a:r>
@@ -24017,11 +23930,7 @@
               <a:t>, </a:t>
             </a:r>
             <a:r>
-              <a:rPr lang="bg-BG" b="1" dirty="0">
-                <a:solidFill>
-                  <a:schemeClr val="bg1"/>
-                </a:solidFill>
-              </a:rPr>
+              <a:rPr lang="bg-BG" b="1" dirty="0"/>
               <a:t>заплати</a:t>
             </a:r>
             <a:r>
@@ -24029,11 +23938,7 @@
               <a:t>, </a:t>
             </a:r>
             <a:r>
-              <a:rPr lang="bg-BG" b="1" dirty="0">
-                <a:solidFill>
-                  <a:schemeClr val="bg1"/>
-                </a:solidFill>
-              </a:rPr>
+              <a:rPr lang="bg-BG" b="1" dirty="0"/>
               <a:t>отпуски</a:t>
             </a:r>
             <a:r>
@@ -24865,7 +24770,7 @@
         </p:spPr>
         <p:txBody>
           <a:bodyPr>
-            <a:normAutofit fontScale="62500" lnSpcReduction="20000"/>
+            <a:normAutofit fontScale="55000" lnSpcReduction="20000"/>
           </a:bodyPr>
           <a:lstStyle>
             <a:lvl1pPr marL="514350" indent="-514350">
@@ -24928,9 +24833,24 @@
               </a:rPr>
               <a:t>Информационни системи</a:t>
             </a:r>
-            <a:endParaRPr lang="en-US" sz="4000" b="1" dirty="0">
+          </a:p>
+          <a:p>
+            <a:pPr marL="969948" lvl="1" indent="-360363" fontAlgn="base">
+              <a:buClr>
+                <a:schemeClr val="bg2"/>
+              </a:buClr>
+            </a:pPr>
+            <a:r>
+              <a:rPr lang="bg-BG" sz="3800" dirty="0">
+                <a:solidFill>
+                  <a:schemeClr val="bg2"/>
+                </a:solidFill>
+              </a:rPr>
+              <a:t>Комбинация от взаимносвързани компоненти, позволяващи работа с информация</a:t>
+            </a:r>
+            <a:endParaRPr lang="en-US" sz="3800" dirty="0">
               <a:solidFill>
-                <a:schemeClr val="accent1"/>
+                <a:schemeClr val="bg2"/>
               </a:solidFill>
             </a:endParaRPr>
           </a:p>
@@ -24941,8 +24861,16 @@
               </a:buClr>
             </a:pPr>
             <a:r>
+              <a:rPr lang="bg-BG" sz="3800" b="1" dirty="0">
+                <a:solidFill>
+                  <a:schemeClr val="accent1"/>
+                </a:solidFill>
+              </a:rPr>
+              <a:t>Роля</a:t>
+            </a:r>
+            <a:r>
               <a:rPr lang="bg-BG" sz="3800" dirty="0"/>
-              <a:t>Роля на информационните системи в реалния свят</a:t>
+              <a:t> на информационните системи в реалния свят</a:t>
             </a:r>
           </a:p>
           <a:p>
@@ -24992,7 +24920,15 @@
             </a:pPr>
             <a:r>
               <a:rPr lang="bg-BG" sz="3800" dirty="0"/>
-              <a:t>Основни понятия</a:t>
+              <a:t>Основни </a:t>
+            </a:r>
+            <a:r>
+              <a:rPr lang="bg-BG" sz="3800" b="1" dirty="0">
+                <a:solidFill>
+                  <a:schemeClr val="accent1"/>
+                </a:solidFill>
+              </a:rPr>
+              <a:t>понятия</a:t>
             </a:r>
           </a:p>
           <a:p>
@@ -25002,96 +24938,16 @@
               </a:buClr>
             </a:pPr>
             <a:r>
-              <a:rPr lang="bg-BG" sz="3600" b="1" dirty="0">
-                <a:solidFill>
-                  <a:schemeClr val="accent1"/>
+              <a:rPr lang="bg-BG" sz="3600" dirty="0">
+                <a:solidFill>
+                  <a:schemeClr val="bg2"/>
                 </a:solidFill>
               </a:rPr>
-              <a:t>Бази данни</a:t>
-            </a:r>
-            <a:r>
-              <a:rPr lang="bg-BG" sz="3600" dirty="0">
-                <a:solidFill>
-                  <a:schemeClr val="bg2"/>
-                </a:solidFill>
-              </a:rPr>
-              <a:t>, </a:t>
-            </a:r>
-            <a:r>
-              <a:rPr lang="bg-BG" sz="3600" b="1" dirty="0">
-                <a:solidFill>
-                  <a:schemeClr val="accent1"/>
-                </a:solidFill>
-              </a:rPr>
-              <a:t>потребителски интерфейс</a:t>
-            </a:r>
-            <a:r>
-              <a:rPr lang="bg-BG" sz="3600" dirty="0">
-                <a:solidFill>
-                  <a:schemeClr val="bg2"/>
-                </a:solidFill>
-              </a:rPr>
-              <a:t>, </a:t>
-            </a:r>
-            <a:r>
-              <a:rPr lang="bg-BG" sz="3600" b="1" dirty="0">
-                <a:solidFill>
-                  <a:schemeClr val="accent1"/>
-                </a:solidFill>
-              </a:rPr>
-              <a:t>мениджмънт на информацията</a:t>
-            </a:r>
-            <a:r>
-              <a:rPr lang="bg-BG" sz="3600" dirty="0">
-                <a:solidFill>
-                  <a:schemeClr val="bg2"/>
-                </a:solidFill>
-              </a:rPr>
-              <a:t>, </a:t>
-            </a:r>
-            <a:r>
-              <a:rPr lang="bg-BG" sz="3600" b="1" dirty="0">
-                <a:solidFill>
-                  <a:schemeClr val="accent1"/>
-                </a:solidFill>
-              </a:rPr>
-              <a:t>система за управление на бази данни</a:t>
-            </a:r>
-            <a:r>
-              <a:rPr lang="bg-BG" sz="3600" dirty="0">
-                <a:solidFill>
-                  <a:schemeClr val="bg2"/>
-                </a:solidFill>
-              </a:rPr>
-              <a:t>, </a:t>
-            </a:r>
-            <a:r>
-              <a:rPr lang="bg-BG" sz="3600" b="1" dirty="0">
-                <a:solidFill>
-                  <a:schemeClr val="accent1"/>
-                </a:solidFill>
-              </a:rPr>
-              <a:t>информационна сигурност</a:t>
-            </a:r>
-            <a:r>
-              <a:rPr lang="bg-BG" sz="3600" dirty="0">
-                <a:solidFill>
-                  <a:schemeClr val="bg2"/>
-                </a:solidFill>
-              </a:rPr>
-              <a:t>, </a:t>
-            </a:r>
-            <a:r>
-              <a:rPr lang="bg-BG" sz="3600" b="1" dirty="0">
-                <a:solidFill>
-                  <a:schemeClr val="accent1"/>
-                </a:solidFill>
-              </a:rPr>
-              <a:t>мрежи и комуникации</a:t>
-            </a:r>
-            <a:endParaRPr lang="bg-BG" sz="3800" b="1" dirty="0">
+              <a:t>Бази данни, потребителски интерфейс, мениджмънт на информацията, система за управление на бази данни, информационна сигурност, мрежи и комуникации</a:t>
+            </a:r>
+            <a:endParaRPr lang="bg-BG" sz="3800" dirty="0">
               <a:solidFill>
-                <a:schemeClr val="accent1"/>
+                <a:schemeClr val="bg2"/>
               </a:solidFill>
             </a:endParaRPr>
           </a:p>
@@ -25102,8 +24958,16 @@
               </a:buClr>
             </a:pPr>
             <a:r>
+              <a:rPr lang="bg-BG" sz="3800" b="1" dirty="0">
+                <a:solidFill>
+                  <a:schemeClr val="accent1"/>
+                </a:solidFill>
+              </a:rPr>
+              <a:t>Елементи</a:t>
+            </a:r>
+            <a:r>
               <a:rPr lang="bg-BG" sz="3800" dirty="0"/>
-              <a:t>Елементи на информационните системи</a:t>
+              <a:t> на информационните системи</a:t>
             </a:r>
           </a:p>
           <a:p>
@@ -25113,92 +24977,12 @@
               </a:buClr>
             </a:pPr>
             <a:r>
-              <a:rPr lang="bg-BG" sz="3600" b="1" dirty="0">
-                <a:solidFill>
-                  <a:schemeClr val="accent1"/>
+              <a:rPr lang="bg-BG" sz="3600" dirty="0">
+                <a:solidFill>
+                  <a:schemeClr val="bg2"/>
                 </a:solidFill>
               </a:rPr>
-              <a:t>Хардуерни</a:t>
-            </a:r>
-            <a:r>
-              <a:rPr lang="bg-BG" sz="3600" dirty="0">
-                <a:solidFill>
-                  <a:schemeClr val="bg2"/>
-                </a:solidFill>
-              </a:rPr>
-              <a:t>, </a:t>
-            </a:r>
-            <a:r>
-              <a:rPr lang="bg-BG" sz="3600" b="1" dirty="0">
-                <a:solidFill>
-                  <a:schemeClr val="accent1"/>
-                </a:solidFill>
-              </a:rPr>
-              <a:t>софтуерни</a:t>
-            </a:r>
-            <a:r>
-              <a:rPr lang="bg-BG" sz="3600" dirty="0">
-                <a:solidFill>
-                  <a:schemeClr val="bg2"/>
-                </a:solidFill>
-              </a:rPr>
-              <a:t>, </a:t>
-            </a:r>
-            <a:r>
-              <a:rPr lang="bg-BG" sz="3600" b="1" dirty="0">
-                <a:solidFill>
-                  <a:schemeClr val="accent1"/>
-                </a:solidFill>
-              </a:rPr>
-              <a:t>данни</a:t>
-            </a:r>
-            <a:r>
-              <a:rPr lang="bg-BG" sz="3600" dirty="0">
-                <a:solidFill>
-                  <a:schemeClr val="bg2"/>
-                </a:solidFill>
-              </a:rPr>
-              <a:t>, </a:t>
-            </a:r>
-            <a:r>
-              <a:rPr lang="bg-BG" sz="3600" b="1" dirty="0">
-                <a:solidFill>
-                  <a:schemeClr val="accent1"/>
-                </a:solidFill>
-              </a:rPr>
-              <a:t>процеси</a:t>
-            </a:r>
-            <a:r>
-              <a:rPr lang="bg-BG" sz="3600" dirty="0">
-                <a:solidFill>
-                  <a:schemeClr val="bg2"/>
-                </a:solidFill>
-              </a:rPr>
-              <a:t>, </a:t>
-            </a:r>
-            <a:r>
-              <a:rPr lang="bg-BG" sz="3600" b="1" dirty="0">
-                <a:solidFill>
-                  <a:schemeClr val="accent1"/>
-                </a:solidFill>
-              </a:rPr>
-              <a:t>потребителски интерфейси</a:t>
-            </a:r>
-            <a:r>
-              <a:rPr lang="bg-BG" sz="3600" dirty="0">
-                <a:solidFill>
-                  <a:schemeClr val="bg2"/>
-                </a:solidFill>
-              </a:rPr>
-              <a:t>, </a:t>
-            </a:r>
-            <a:r>
-              <a:rPr lang="bg-BG" sz="3600" b="1" dirty="0">
-                <a:solidFill>
-                  <a:schemeClr val="accent1"/>
-                </a:solidFill>
-              </a:rPr>
-              <a:t>хора</a:t>
+              <a:t>Хардуерни, софтуерни, данни, процеси, потребителски интерфейси, хора</a:t>
             </a:r>
           </a:p>
           <a:p>
@@ -25208,8 +24992,16 @@
               </a:buClr>
             </a:pPr>
             <a:r>
+              <a:rPr lang="bg-BG" sz="3800" b="1" dirty="0">
+                <a:solidFill>
+                  <a:schemeClr val="accent1"/>
+                </a:solidFill>
+              </a:rPr>
+              <a:t>Видове</a:t>
+            </a:r>
+            <a:r>
               <a:rPr lang="bg-BG" sz="3800" dirty="0"/>
-              <a:t>Видове информационни системи</a:t>
+              <a:t> информационни системи</a:t>
             </a:r>
             <a:r>
               <a:rPr lang="en-US" sz="3800" dirty="0"/>
@@ -25396,33 +25188,15 @@
                                   </p:childTnLst>
                                 </p:cTn>
                               </p:par>
-                            </p:childTnLst>
-                          </p:cTn>
-                        </p:par>
-                      </p:childTnLst>
-                    </p:cTn>
-                  </p:par>
-                  <p:par>
-                    <p:cTn id="7" fill="hold">
-                      <p:stCondLst>
-                        <p:cond delay="indefinite"/>
-                      </p:stCondLst>
-                      <p:childTnLst>
-                        <p:par>
-                          <p:cTn id="8" fill="hold">
-                            <p:stCondLst>
-                              <p:cond delay="0"/>
-                            </p:stCondLst>
-                            <p:childTnLst>
                               <p:par>
-                                <p:cTn id="9" presetID="1" presetClass="entr" presetSubtype="0" fill="hold" nodeType="clickEffect">
+                                <p:cTn id="7" presetID="1" presetClass="entr" presetSubtype="0" fill="hold" nodeType="withEffect">
                                   <p:stCondLst>
                                     <p:cond delay="0"/>
                                   </p:stCondLst>
                                   <p:childTnLst>
                                     <p:set>
                                       <p:cBhvr>
-                                        <p:cTn id="10" dur="1" fill="hold">
+                                        <p:cTn id="8" dur="1" fill="hold">
                                           <p:stCondLst>
                                             <p:cond delay="0"/>
                                           </p:stCondLst>
@@ -25445,8 +25219,26 @@
                                   </p:childTnLst>
                                 </p:cTn>
                               </p:par>
+                            </p:childTnLst>
+                          </p:cTn>
+                        </p:par>
+                      </p:childTnLst>
+                    </p:cTn>
+                  </p:par>
+                  <p:par>
+                    <p:cTn id="9" fill="hold">
+                      <p:stCondLst>
+                        <p:cond delay="indefinite"/>
+                      </p:stCondLst>
+                      <p:childTnLst>
+                        <p:par>
+                          <p:cTn id="10" fill="hold">
+                            <p:stCondLst>
+                              <p:cond delay="0"/>
+                            </p:stCondLst>
+                            <p:childTnLst>
                               <p:par>
-                                <p:cTn id="11" presetID="1" presetClass="entr" presetSubtype="0" fill="hold" nodeType="withEffect">
+                                <p:cTn id="11" presetID="1" presetClass="entr" presetSubtype="0" fill="hold" nodeType="clickEffect">
                                   <p:stCondLst>
                                     <p:cond delay="0"/>
                                   </p:stCondLst>
@@ -25476,33 +25268,15 @@
                                   </p:childTnLst>
                                 </p:cTn>
                               </p:par>
-                            </p:childTnLst>
-                          </p:cTn>
-                        </p:par>
-                      </p:childTnLst>
-                    </p:cTn>
-                  </p:par>
-                  <p:par>
-                    <p:cTn id="13" fill="hold">
-                      <p:stCondLst>
-                        <p:cond delay="indefinite"/>
-                      </p:stCondLst>
-                      <p:childTnLst>
-                        <p:par>
-                          <p:cTn id="14" fill="hold">
-                            <p:stCondLst>
-                              <p:cond delay="0"/>
-                            </p:stCondLst>
-                            <p:childTnLst>
                               <p:par>
-                                <p:cTn id="15" presetID="1" presetClass="entr" presetSubtype="0" fill="hold" nodeType="clickEffect">
+                                <p:cTn id="13" presetID="1" presetClass="entr" presetSubtype="0" fill="hold" nodeType="withEffect">
                                   <p:stCondLst>
                                     <p:cond delay="0"/>
                                   </p:stCondLst>
                                   <p:childTnLst>
                                     <p:set>
                                       <p:cBhvr>
-                                        <p:cTn id="16" dur="1" fill="hold">
+                                        <p:cTn id="14" dur="1" fill="hold">
                                           <p:stCondLst>
                                             <p:cond delay="0"/>
                                           </p:stCondLst>
@@ -25525,8 +25299,26 @@
                                   </p:childTnLst>
                                 </p:cTn>
                               </p:par>
+                            </p:childTnLst>
+                          </p:cTn>
+                        </p:par>
+                      </p:childTnLst>
+                    </p:cTn>
+                  </p:par>
+                  <p:par>
+                    <p:cTn id="15" fill="hold">
+                      <p:stCondLst>
+                        <p:cond delay="indefinite"/>
+                      </p:stCondLst>
+                      <p:childTnLst>
+                        <p:par>
+                          <p:cTn id="16" fill="hold">
+                            <p:stCondLst>
+                              <p:cond delay="0"/>
+                            </p:stCondLst>
+                            <p:childTnLst>
                               <p:par>
-                                <p:cTn id="17" presetID="1" presetClass="entr" presetSubtype="0" fill="hold" nodeType="withEffect">
+                                <p:cTn id="17" presetID="1" presetClass="entr" presetSubtype="0" fill="hold" nodeType="clickEffect">
                                   <p:stCondLst>
                                     <p:cond delay="0"/>
                                   </p:stCondLst>
@@ -25556,33 +25348,15 @@
                                   </p:childTnLst>
                                 </p:cTn>
                               </p:par>
-                            </p:childTnLst>
-                          </p:cTn>
-                        </p:par>
-                      </p:childTnLst>
-                    </p:cTn>
-                  </p:par>
-                  <p:par>
-                    <p:cTn id="19" fill="hold">
-                      <p:stCondLst>
-                        <p:cond delay="indefinite"/>
-                      </p:stCondLst>
-                      <p:childTnLst>
-                        <p:par>
-                          <p:cTn id="20" fill="hold">
-                            <p:stCondLst>
-                              <p:cond delay="0"/>
-                            </p:stCondLst>
-                            <p:childTnLst>
                               <p:par>
-                                <p:cTn id="21" presetID="1" presetClass="entr" presetSubtype="0" fill="hold" nodeType="clickEffect">
+                                <p:cTn id="19" presetID="1" presetClass="entr" presetSubtype="0" fill="hold" nodeType="withEffect">
                                   <p:stCondLst>
                                     <p:cond delay="0"/>
                                   </p:stCondLst>
                                   <p:childTnLst>
                                     <p:set>
                                       <p:cBhvr>
-                                        <p:cTn id="22" dur="1" fill="hold">
+                                        <p:cTn id="20" dur="1" fill="hold">
                                           <p:stCondLst>
                                             <p:cond delay="0"/>
                                           </p:stCondLst>
@@ -25605,8 +25379,26 @@
                                   </p:childTnLst>
                                 </p:cTn>
                               </p:par>
+                            </p:childTnLst>
+                          </p:cTn>
+                        </p:par>
+                      </p:childTnLst>
+                    </p:cTn>
+                  </p:par>
+                  <p:par>
+                    <p:cTn id="21" fill="hold">
+                      <p:stCondLst>
+                        <p:cond delay="indefinite"/>
+                      </p:stCondLst>
+                      <p:childTnLst>
+                        <p:par>
+                          <p:cTn id="22" fill="hold">
+                            <p:stCondLst>
+                              <p:cond delay="0"/>
+                            </p:stCondLst>
+                            <p:childTnLst>
                               <p:par>
-                                <p:cTn id="23" presetID="1" presetClass="entr" presetSubtype="0" fill="hold" nodeType="withEffect">
+                                <p:cTn id="23" presetID="1" presetClass="entr" presetSubtype="0" fill="hold" nodeType="clickEffect">
                                   <p:stCondLst>
                                     <p:cond delay="0"/>
                                   </p:stCondLst>
@@ -25636,33 +25428,15 @@
                                   </p:childTnLst>
                                 </p:cTn>
                               </p:par>
-                            </p:childTnLst>
-                          </p:cTn>
-                        </p:par>
-                      </p:childTnLst>
-                    </p:cTn>
-                  </p:par>
-                  <p:par>
-                    <p:cTn id="25" fill="hold">
-                      <p:stCondLst>
-                        <p:cond delay="indefinite"/>
-                      </p:stCondLst>
-                      <p:childTnLst>
-                        <p:par>
-                          <p:cTn id="26" fill="hold">
-                            <p:stCondLst>
-                              <p:cond delay="0"/>
-                            </p:stCondLst>
-                            <p:childTnLst>
                               <p:par>
-                                <p:cTn id="27" presetID="1" presetClass="entr" presetSubtype="0" fill="hold" nodeType="clickEffect">
+                                <p:cTn id="25" presetID="1" presetClass="entr" presetSubtype="0" fill="hold" nodeType="withEffect">
                                   <p:stCondLst>
                                     <p:cond delay="0"/>
                                   </p:stCondLst>
                                   <p:childTnLst>
                                     <p:set>
                                       <p:cBhvr>
-                                        <p:cTn id="28" dur="1" fill="hold">
+                                        <p:cTn id="26" dur="1" fill="hold">
                                           <p:stCondLst>
                                             <p:cond delay="0"/>
                                           </p:stCondLst>
@@ -25671,6 +25445,55 @@
                                           <p:spTgt spid="14">
                                             <p:txEl>
                                               <p:pRg st="7" end="7"/>
+                                            </p:txEl>
+                                          </p:spTgt>
+                                        </p:tgtEl>
+                                        <p:attrNameLst>
+                                          <p:attrName>style.visibility</p:attrName>
+                                        </p:attrNameLst>
+                                      </p:cBhvr>
+                                      <p:to>
+                                        <p:strVal val="visible"/>
+                                      </p:to>
+                                    </p:set>
+                                  </p:childTnLst>
+                                </p:cTn>
+                              </p:par>
+                            </p:childTnLst>
+                          </p:cTn>
+                        </p:par>
+                      </p:childTnLst>
+                    </p:cTn>
+                  </p:par>
+                  <p:par>
+                    <p:cTn id="27" fill="hold">
+                      <p:stCondLst>
+                        <p:cond delay="indefinite"/>
+                      </p:stCondLst>
+                      <p:childTnLst>
+                        <p:par>
+                          <p:cTn id="28" fill="hold">
+                            <p:stCondLst>
+                              <p:cond delay="0"/>
+                            </p:stCondLst>
+                            <p:childTnLst>
+                              <p:par>
+                                <p:cTn id="29" presetID="1" presetClass="entr" presetSubtype="0" fill="hold" nodeType="clickEffect">
+                                  <p:stCondLst>
+                                    <p:cond delay="0"/>
+                                  </p:stCondLst>
+                                  <p:childTnLst>
+                                    <p:set>
+                                      <p:cBhvr>
+                                        <p:cTn id="30" dur="1" fill="hold">
+                                          <p:stCondLst>
+                                            <p:cond delay="0"/>
+                                          </p:stCondLst>
+                                        </p:cTn>
+                                        <p:tgtEl>
+                                          <p:spTgt spid="14">
+                                            <p:txEl>
+                                              <p:pRg st="8" end="8"/>
                                             </p:txEl>
                                           </p:spTgt>
                                         </p:tgtEl>
@@ -26905,11 +26728,7 @@
               <a:t>Помагат за </a:t>
             </a:r>
             <a:r>
-              <a:rPr lang="bg-BG" b="1" dirty="0">
-                <a:solidFill>
-                  <a:schemeClr val="bg1"/>
-                </a:solidFill>
-              </a:rPr>
+              <a:rPr lang="bg-BG" b="1" dirty="0"/>
               <a:t>вземане на решения</a:t>
             </a:r>
             <a:r>
@@ -26917,11 +26736,7 @@
               <a:t>, </a:t>
             </a:r>
             <a:r>
-              <a:rPr lang="bg-BG" b="1" dirty="0">
-                <a:solidFill>
-                  <a:schemeClr val="bg1"/>
-                </a:solidFill>
-              </a:rPr>
+              <a:rPr lang="bg-BG" b="1" dirty="0"/>
               <a:t>управление на ресурси</a:t>
             </a:r>
             <a:r>
@@ -26929,16 +26744,20 @@
               <a:t>, </a:t>
             </a:r>
             <a:r>
+              <a:rPr lang="bg-BG" b="1" dirty="0"/>
+              <a:t>комуникация</a:t>
+            </a:r>
+            <a:r>
               <a:rPr lang="bg-BG" b="1" dirty="0">
                 <a:solidFill>
                   <a:schemeClr val="bg1"/>
                 </a:solidFill>
               </a:rPr>
-              <a:t>комуникация между нивата в организацията </a:t>
+              <a:t> </a:t>
             </a:r>
             <a:r>
               <a:rPr lang="bg-BG" dirty="0"/>
-              <a:t>и др.</a:t>
+              <a:t>между нивата в организацията и др.</a:t>
             </a:r>
           </a:p>
           <a:p>
@@ -26962,11 +26781,7 @@
               <a:t>Предоставят </a:t>
             </a:r>
             <a:r>
-              <a:rPr lang="bg-BG" b="1" dirty="0">
-                <a:solidFill>
-                  <a:schemeClr val="bg1"/>
-                </a:solidFill>
-              </a:rPr>
+              <a:rPr lang="bg-BG" b="1" dirty="0"/>
               <a:t>средства</a:t>
             </a:r>
             <a:r>
@@ -26974,11 +26789,7 @@
               <a:t> за </a:t>
             </a:r>
             <a:r>
-              <a:rPr lang="bg-BG" b="1" dirty="0">
-                <a:solidFill>
-                  <a:schemeClr val="bg1"/>
-                </a:solidFill>
-              </a:rPr>
+              <a:rPr lang="bg-BG" b="1" dirty="0"/>
               <a:t>бързо</a:t>
             </a:r>
             <a:r>
@@ -26986,11 +26797,7 @@
               <a:t> и </a:t>
             </a:r>
             <a:r>
-              <a:rPr lang="bg-BG" b="1" dirty="0">
-                <a:solidFill>
-                  <a:schemeClr val="bg1"/>
-                </a:solidFill>
-              </a:rPr>
+              <a:rPr lang="bg-BG" b="1" dirty="0"/>
               <a:t>ефективно комуникиране </a:t>
             </a:r>
             <a:r>
@@ -27407,11 +27214,7 @@
               <a:t>Предоставят </a:t>
             </a:r>
             <a:r>
-              <a:rPr lang="bg-BG" sz="3000" b="1" dirty="0">
-                <a:solidFill>
-                  <a:schemeClr val="bg1"/>
-                </a:solidFill>
-              </a:rPr>
+              <a:rPr lang="bg-BG" sz="3000" b="1" dirty="0"/>
               <a:t>достъп</a:t>
             </a:r>
             <a:r>
@@ -27419,11 +27222,7 @@
               <a:t> до информация, </a:t>
             </a:r>
             <a:r>
-              <a:rPr lang="bg-BG" sz="3000" b="1" dirty="0">
-                <a:solidFill>
-                  <a:schemeClr val="bg1"/>
-                </a:solidFill>
-              </a:rPr>
+              <a:rPr lang="bg-BG" sz="3000" b="1" dirty="0"/>
               <a:t>инструменти</a:t>
             </a:r>
             <a:r>
@@ -27431,11 +27230,7 @@
               <a:t> и </a:t>
             </a:r>
             <a:r>
-              <a:rPr lang="bg-BG" sz="3000" b="1" dirty="0">
-                <a:solidFill>
-                  <a:schemeClr val="bg1"/>
-                </a:solidFill>
-              </a:rPr>
+              <a:rPr lang="bg-BG" sz="3000" b="1" dirty="0"/>
               <a:t>средства</a:t>
             </a:r>
             <a:r>
@@ -27443,11 +27238,7 @@
               <a:t> за </a:t>
             </a:r>
             <a:r>
-              <a:rPr lang="bg-BG" sz="3000" b="1" dirty="0">
-                <a:solidFill>
-                  <a:schemeClr val="bg1"/>
-                </a:solidFill>
-              </a:rPr>
+              <a:rPr lang="bg-BG" sz="3000" b="1" dirty="0"/>
               <a:t>анализ</a:t>
             </a:r>
             <a:r>
@@ -27455,11 +27246,7 @@
               <a:t> и </a:t>
             </a:r>
             <a:r>
-              <a:rPr lang="bg-BG" sz="3000" b="1" dirty="0">
-                <a:solidFill>
-                  <a:schemeClr val="bg1"/>
-                </a:solidFill>
-              </a:rPr>
+              <a:rPr lang="bg-BG" sz="3000" b="1" dirty="0"/>
               <a:t>споделяне</a:t>
             </a:r>
             <a:r>
@@ -27467,11 +27254,7 @@
               <a:t> </a:t>
             </a:r>
             <a:r>
-              <a:rPr lang="bg-BG" sz="3000" b="1" dirty="0">
-                <a:solidFill>
-                  <a:schemeClr val="bg1"/>
-                </a:solidFill>
-              </a:rPr>
+              <a:rPr lang="bg-BG" sz="3000" b="1" dirty="0"/>
               <a:t>на резултати</a:t>
             </a:r>
           </a:p>
@@ -27496,11 +27279,7 @@
               <a:t>Улесняват достъпа до </a:t>
             </a:r>
             <a:r>
-              <a:rPr lang="bg-BG" sz="3000" b="1" dirty="0">
-                <a:solidFill>
-                  <a:schemeClr val="bg1"/>
-                </a:solidFill>
-              </a:rPr>
+              <a:rPr lang="bg-BG" sz="3000" b="1" dirty="0"/>
               <a:t>учебни материали</a:t>
             </a:r>
             <a:r>
@@ -27508,11 +27287,7 @@
               <a:t>, </a:t>
             </a:r>
             <a:r>
-              <a:rPr lang="bg-BG" sz="3000" b="1" dirty="0">
-                <a:solidFill>
-                  <a:schemeClr val="bg1"/>
-                </a:solidFill>
-              </a:rPr>
+              <a:rPr lang="bg-BG" sz="3000" b="1" dirty="0"/>
               <a:t>интерактивни уроци</a:t>
             </a:r>
             <a:r>
@@ -27520,11 +27295,7 @@
               <a:t>, </a:t>
             </a:r>
             <a:r>
-              <a:rPr lang="bg-BG" sz="3000" b="1" dirty="0">
-                <a:solidFill>
-                  <a:schemeClr val="bg1"/>
-                </a:solidFill>
-              </a:rPr>
+              <a:rPr lang="bg-BG" sz="3000" b="1" dirty="0"/>
               <a:t>онлайн курсове</a:t>
             </a:r>
           </a:p>
@@ -27606,7 +27377,7 @@
           <p:nvPr/>
         </p:nvPicPr>
         <p:blipFill>
-          <a:blip r:embed="rId2">
+          <a:blip r:embed="rId3">
             <a:extLst>
               <a:ext uri="{28A0092B-C50C-407E-A947-70E740481C1C}">
                 <a14:useLocalDpi xmlns:a14="http://schemas.microsoft.com/office/drawing/2010/main" val="0"/>

</xml_diff>